<commit_message>
Összegzés fejlesztve :laughing: :laughing: :100:
</commit_message>
<xml_diff>
--- a/projektlab.pptx
+++ b/projektlab.pptx
@@ -4643,7 +4643,6 @@
               <a:rPr lang="hu-HU" dirty="0"/>
               <a:t>Alkalmazásfejlesztés web alapú mobil platformra</a:t>
             </a:r>
-            <a:endParaRPr lang="hu-HU" dirty="0"/>
           </a:p>
         </p:txBody>
       </p:sp>
@@ -5651,25 +5650,7 @@
               <a:srgbClr val="C0C0C0"/>
             </a:contourClr>
           </a:sp3d>
-          <a:extLst>
-            <a:ext uri="{909E8E84-426E-40DD-AFC4-6F175D3DCCD1}">
-              <a14:hiddenFill xmlns:a14="http://schemas.microsoft.com/office/drawing/2010/main">
-                <a:solidFill>
-                  <a:schemeClr val="accent1"/>
-                </a:solidFill>
-              </a14:hiddenFill>
-            </a:ext>
-            <a:ext uri="{91240B29-F687-4F45-9708-019B960494DF}">
-              <a14:hiddenLine xmlns:a14="http://schemas.microsoft.com/office/drawing/2010/main" w="9525">
-                <a:solidFill>
-                  <a:schemeClr val="tx1"/>
-                </a:solidFill>
-                <a:miter lim="800000"/>
-                <a:headEnd/>
-                <a:tailEnd/>
-              </a14:hiddenLine>
-            </a:ext>
-          </a:extLst>
+          <a:extLst/>
         </p:spPr>
       </p:pic>
     </p:spTree>
@@ -5800,6 +5781,10 @@
           <a:bodyPr/>
           <a:lstStyle/>
           <a:p>
+            <a:r>
+              <a:rPr lang="hu-HU" smtClean="0"/>
+              <a:t>Tancsics László BÚÚÚTA EMBER XDSXDXD</a:t>
+            </a:r>
             <a:endParaRPr lang="hu-HU" dirty="0"/>
           </a:p>
         </p:txBody>
@@ -6553,25 +6538,7 @@
               <a:srgbClr val="C0C0C0"/>
             </a:contourClr>
           </a:sp3d>
-          <a:extLst>
-            <a:ext uri="{909E8E84-426E-40DD-AFC4-6F175D3DCCD1}">
-              <a14:hiddenFill xmlns:a14="http://schemas.microsoft.com/office/drawing/2010/main">
-                <a:solidFill>
-                  <a:schemeClr val="accent1"/>
-                </a:solidFill>
-              </a14:hiddenFill>
-            </a:ext>
-            <a:ext uri="{91240B29-F687-4F45-9708-019B960494DF}">
-              <a14:hiddenLine xmlns:a14="http://schemas.microsoft.com/office/drawing/2010/main" w="9525">
-                <a:solidFill>
-                  <a:schemeClr val="tx1"/>
-                </a:solidFill>
-                <a:miter lim="800000"/>
-                <a:headEnd/>
-                <a:tailEnd/>
-              </a14:hiddenLine>
-            </a:ext>
-          </a:extLst>
+          <a:extLst/>
         </p:spPr>
       </p:pic>
     </p:spTree>
@@ -6712,25 +6679,7 @@
               <a:srgbClr val="C0C0C0"/>
             </a:contourClr>
           </a:sp3d>
-          <a:extLst>
-            <a:ext uri="{909E8E84-426E-40DD-AFC4-6F175D3DCCD1}">
-              <a14:hiddenFill xmlns:a14="http://schemas.microsoft.com/office/drawing/2010/main">
-                <a:solidFill>
-                  <a:schemeClr val="accent1"/>
-                </a:solidFill>
-              </a14:hiddenFill>
-            </a:ext>
-            <a:ext uri="{91240B29-F687-4F45-9708-019B960494DF}">
-              <a14:hiddenLine xmlns:a14="http://schemas.microsoft.com/office/drawing/2010/main" w="9525">
-                <a:solidFill>
-                  <a:schemeClr val="tx1"/>
-                </a:solidFill>
-                <a:miter lim="800000"/>
-                <a:headEnd/>
-                <a:tailEnd/>
-              </a14:hiddenLine>
-            </a:ext>
-          </a:extLst>
+          <a:extLst/>
         </p:spPr>
       </p:pic>
     </p:spTree>
@@ -6856,25 +6805,7 @@
               <a:srgbClr val="C0C0C0"/>
             </a:contourClr>
           </a:sp3d>
-          <a:extLst>
-            <a:ext uri="{909E8E84-426E-40DD-AFC4-6F175D3DCCD1}">
-              <a14:hiddenFill xmlns:a14="http://schemas.microsoft.com/office/drawing/2010/main">
-                <a:solidFill>
-                  <a:schemeClr val="accent1"/>
-                </a:solidFill>
-              </a14:hiddenFill>
-            </a:ext>
-            <a:ext uri="{91240B29-F687-4F45-9708-019B960494DF}">
-              <a14:hiddenLine xmlns:a14="http://schemas.microsoft.com/office/drawing/2010/main" w="9525">
-                <a:solidFill>
-                  <a:schemeClr val="tx1"/>
-                </a:solidFill>
-                <a:miter lim="800000"/>
-                <a:headEnd/>
-                <a:tailEnd/>
-              </a14:hiddenLine>
-            </a:ext>
-          </a:extLst>
+          <a:extLst/>
         </p:spPr>
       </p:pic>
     </p:spTree>
@@ -7015,25 +6946,7 @@
               <a:srgbClr val="C0C0C0"/>
             </a:contourClr>
           </a:sp3d>
-          <a:extLst>
-            <a:ext uri="{909E8E84-426E-40DD-AFC4-6F175D3DCCD1}">
-              <a14:hiddenFill xmlns:a14="http://schemas.microsoft.com/office/drawing/2010/main">
-                <a:solidFill>
-                  <a:schemeClr val="accent1"/>
-                </a:solidFill>
-              </a14:hiddenFill>
-            </a:ext>
-            <a:ext uri="{91240B29-F687-4F45-9708-019B960494DF}">
-              <a14:hiddenLine xmlns:a14="http://schemas.microsoft.com/office/drawing/2010/main" w="9525">
-                <a:solidFill>
-                  <a:schemeClr val="tx1"/>
-                </a:solidFill>
-                <a:miter lim="800000"/>
-                <a:headEnd/>
-                <a:tailEnd/>
-              </a14:hiddenLine>
-            </a:ext>
-          </a:extLst>
+          <a:extLst/>
         </p:spPr>
       </p:pic>
     </p:spTree>

</xml_diff>

<commit_message>
Bidből adatb-be töltés fixed, Prezi frissitve ehhez
</commit_message>
<xml_diff>
--- a/projektlab.pptx
+++ b/projektlab.pptx
@@ -5594,7 +5594,7 @@
       </p:pic>
       <p:pic>
         <p:nvPicPr>
-          <p:cNvPr id="8198" name="Picture 6"/>
+          <p:cNvPr id="2050" name="Picture 2"/>
           <p:cNvPicPr>
             <a:picLocks noChangeAspect="1" noChangeArrowheads="1"/>
           </p:cNvPicPr>
@@ -5615,8 +5615,8 @@
         </p:blipFill>
         <p:spPr bwMode="auto">
           <a:xfrm>
-            <a:off x="1211952" y="1758652"/>
-            <a:ext cx="6715125" cy="4095750"/>
+            <a:off x="947738" y="1438275"/>
+            <a:ext cx="7248525" cy="3981450"/>
           </a:xfrm>
           <a:prstGeom prst="rect">
             <a:avLst/>
@@ -5650,7 +5650,25 @@
               <a:srgbClr val="C0C0C0"/>
             </a:contourClr>
           </a:sp3d>
-          <a:extLst/>
+          <a:extLst>
+            <a:ext uri="{909E8E84-426E-40DD-AFC4-6F175D3DCCD1}">
+              <a14:hiddenFill xmlns:a14="http://schemas.microsoft.com/office/drawing/2010/main">
+                <a:solidFill>
+                  <a:schemeClr val="accent1"/>
+                </a:solidFill>
+              </a14:hiddenFill>
+            </a:ext>
+            <a:ext uri="{91240B29-F687-4F45-9708-019B960494DF}">
+              <a14:hiddenLine xmlns:a14="http://schemas.microsoft.com/office/drawing/2010/main" w="9525">
+                <a:solidFill>
+                  <a:schemeClr val="tx1"/>
+                </a:solidFill>
+                <a:miter lim="800000"/>
+                <a:headEnd/>
+                <a:tailEnd/>
+              </a14:hiddenLine>
+            </a:ext>
+          </a:extLst>
         </p:spPr>
       </p:pic>
     </p:spTree>
@@ -5684,7 +5702,7 @@
                             </p:stCondLst>
                             <p:childTnLst>
                               <p:par>
-                                <p:cTn id="5" presetID="10" presetClass="entr" presetSubtype="0" fill="hold" nodeType="clickEffect">
+                                <p:cTn id="5" presetID="1" presetClass="entr" presetSubtype="0" fill="hold" nodeType="clickEffect">
                                   <p:stCondLst>
                                     <p:cond delay="0"/>
                                   </p:stCondLst>
@@ -5697,7 +5715,7 @@
                                           </p:stCondLst>
                                         </p:cTn>
                                         <p:tgtEl>
-                                          <p:spTgt spid="8198"/>
+                                          <p:spTgt spid="2050"/>
                                         </p:tgtEl>
                                         <p:attrNameLst>
                                           <p:attrName>style.visibility</p:attrName>
@@ -5707,14 +5725,6 @@
                                         <p:strVal val="visible"/>
                                       </p:to>
                                     </p:set>
-                                    <p:animEffect transition="in" filter="fade">
-                                      <p:cBhvr>
-                                        <p:cTn id="7" dur="500"/>
-                                        <p:tgtEl>
-                                          <p:spTgt spid="8198"/>
-                                        </p:tgtEl>
-                                      </p:cBhvr>
-                                    </p:animEffect>
                                   </p:childTnLst>
                                 </p:cTn>
                               </p:par>
@@ -6745,15 +6755,32 @@
           </a:p>
         </p:txBody>
       </p:sp>
+      <p:sp>
+        <p:nvSpPr>
+          <p:cNvPr id="5" name="Content Placeholder 4"/>
+          <p:cNvSpPr>
+            <a:spLocks noGrp="1"/>
+          </p:cNvSpPr>
+          <p:nvPr>
+            <p:ph idx="1"/>
+          </p:nvPr>
+        </p:nvSpPr>
+        <p:spPr/>
+        <p:txBody>
+          <a:bodyPr/>
+          <a:lstStyle/>
+          <a:p>
+            <a:endParaRPr lang="hu-HU"/>
+          </a:p>
+        </p:txBody>
+      </p:sp>
       <p:pic>
         <p:nvPicPr>
-          <p:cNvPr id="4" name="Content Placeholder 3"/>
+          <p:cNvPr id="1027" name="Picture 3"/>
           <p:cNvPicPr>
-            <a:picLocks noGrp="1" noChangeAspect="1" noChangeArrowheads="1"/>
+            <a:picLocks noChangeAspect="1" noChangeArrowheads="1"/>
           </p:cNvPicPr>
-          <p:nvPr>
-            <p:ph idx="1"/>
-          </p:nvPr>
+          <p:nvPr/>
         </p:nvPicPr>
         <p:blipFill>
           <a:blip r:embed="rId2">
@@ -6770,8 +6797,8 @@
         </p:blipFill>
         <p:spPr bwMode="auto">
           <a:xfrm>
-            <a:off x="457200" y="1659766"/>
-            <a:ext cx="8229600" cy="4168705"/>
+            <a:off x="1014413" y="1647825"/>
+            <a:ext cx="7115175" cy="3562350"/>
           </a:xfrm>
           <a:prstGeom prst="rect">
             <a:avLst/>
@@ -6805,7 +6832,25 @@
               <a:srgbClr val="C0C0C0"/>
             </a:contourClr>
           </a:sp3d>
-          <a:extLst/>
+          <a:extLst>
+            <a:ext uri="{909E8E84-426E-40DD-AFC4-6F175D3DCCD1}">
+              <a14:hiddenFill xmlns:a14="http://schemas.microsoft.com/office/drawing/2010/main">
+                <a:solidFill>
+                  <a:schemeClr val="accent1"/>
+                </a:solidFill>
+              </a14:hiddenFill>
+            </a:ext>
+            <a:ext uri="{91240B29-F687-4F45-9708-019B960494DF}">
+              <a14:hiddenLine xmlns:a14="http://schemas.microsoft.com/office/drawing/2010/main" w="9525">
+                <a:solidFill>
+                  <a:schemeClr val="tx1"/>
+                </a:solidFill>
+                <a:miter lim="800000"/>
+                <a:headEnd/>
+                <a:tailEnd/>
+              </a14:hiddenLine>
+            </a:ext>
+          </a:extLst>
         </p:spPr>
       </p:pic>
     </p:spTree>

</xml_diff>

<commit_message>
Magyar kezdőlap, kész prezi
</commit_message>
<xml_diff>
--- a/projektlab.pptx
+++ b/projektlab.pptx
@@ -1,9 +1,12 @@
 
 <file path=ppt/presentation.xml><?xml version="1.0" encoding="utf-8"?>
-<p:presentation xmlns:a="http://schemas.openxmlformats.org/drawingml/2006/main" xmlns:r="http://schemas.openxmlformats.org/officeDocument/2006/relationships" xmlns:p="http://schemas.openxmlformats.org/presentationml/2006/main" saveSubsetFonts="1">
+<p:presentation xmlns:a="http://schemas.openxmlformats.org/drawingml/2006/main" xmlns:r="http://schemas.openxmlformats.org/officeDocument/2006/relationships" xmlns:p="http://schemas.openxmlformats.org/presentationml/2006/main" showSpecialPlsOnTitleSld="0" saveSubsetFonts="1">
   <p:sldMasterIdLst>
     <p:sldMasterId id="2147483672" r:id="rId1"/>
   </p:sldMasterIdLst>
+  <p:notesMasterIdLst>
+    <p:notesMasterId r:id="rId16"/>
+  </p:notesMasterIdLst>
   <p:sldIdLst>
     <p:sldId id="256" r:id="rId2"/>
     <p:sldId id="257" r:id="rId3"/>
@@ -15,11 +18,10 @@
     <p:sldId id="262" r:id="rId9"/>
     <p:sldId id="264" r:id="rId10"/>
     <p:sldId id="265" r:id="rId11"/>
-    <p:sldId id="266" r:id="rId12"/>
-    <p:sldId id="267" r:id="rId13"/>
-    <p:sldId id="268" r:id="rId14"/>
-    <p:sldId id="269" r:id="rId15"/>
-    <p:sldId id="271" r:id="rId16"/>
+    <p:sldId id="267" r:id="rId12"/>
+    <p:sldId id="268" r:id="rId13"/>
+    <p:sldId id="269" r:id="rId14"/>
+    <p:sldId id="271" r:id="rId15"/>
   </p:sldIdLst>
   <p:sldSz cx="9144000" cy="6858000" type="screen4x3"/>
   <p:notesSz cx="6858000" cy="9144000"/>
@@ -119,6 +121,440 @@
     </a:lvl9pPr>
   </p:defaultTextStyle>
 </p:presentation>
+</file>
+
+<file path=ppt/notesMasters/notesMaster1.xml><?xml version="1.0" encoding="utf-8"?>
+<p:notesMaster xmlns:a="http://schemas.openxmlformats.org/drawingml/2006/main" xmlns:r="http://schemas.openxmlformats.org/officeDocument/2006/relationships" xmlns:p="http://schemas.openxmlformats.org/presentationml/2006/main">
+  <p:cSld>
+    <p:bg>
+      <p:bgRef idx="1001">
+        <a:schemeClr val="bg1"/>
+      </p:bgRef>
+    </p:bg>
+    <p:spTree>
+      <p:nvGrpSpPr>
+        <p:cNvPr id="1" name=""/>
+        <p:cNvGrpSpPr/>
+        <p:nvPr/>
+      </p:nvGrpSpPr>
+      <p:grpSpPr>
+        <a:xfrm>
+          <a:off x="0" y="0"/>
+          <a:ext cx="0" cy="0"/>
+          <a:chOff x="0" y="0"/>
+          <a:chExt cx="0" cy="0"/>
+        </a:xfrm>
+      </p:grpSpPr>
+      <p:sp>
+        <p:nvSpPr>
+          <p:cNvPr id="2" name="Header Placeholder 1"/>
+          <p:cNvSpPr>
+            <a:spLocks noGrp="1"/>
+          </p:cNvSpPr>
+          <p:nvPr>
+            <p:ph type="hdr" sz="quarter"/>
+          </p:nvPr>
+        </p:nvSpPr>
+        <p:spPr>
+          <a:xfrm>
+            <a:off x="0" y="0"/>
+            <a:ext cx="2971800" cy="457200"/>
+          </a:xfrm>
+          <a:prstGeom prst="rect">
+            <a:avLst/>
+          </a:prstGeom>
+        </p:spPr>
+        <p:txBody>
+          <a:bodyPr vert="horz" lIns="91440" tIns="45720" rIns="91440" bIns="45720" rtlCol="0"/>
+          <a:lstStyle>
+            <a:lvl1pPr algn="l">
+              <a:defRPr sz="1200"/>
+            </a:lvl1pPr>
+          </a:lstStyle>
+          <a:p>
+            <a:endParaRPr lang="hu-HU"/>
+          </a:p>
+        </p:txBody>
+      </p:sp>
+      <p:sp>
+        <p:nvSpPr>
+          <p:cNvPr id="3" name="Date Placeholder 2"/>
+          <p:cNvSpPr>
+            <a:spLocks noGrp="1"/>
+          </p:cNvSpPr>
+          <p:nvPr>
+            <p:ph type="dt" idx="1"/>
+          </p:nvPr>
+        </p:nvSpPr>
+        <p:spPr>
+          <a:xfrm>
+            <a:off x="3884613" y="0"/>
+            <a:ext cx="2971800" cy="457200"/>
+          </a:xfrm>
+          <a:prstGeom prst="rect">
+            <a:avLst/>
+          </a:prstGeom>
+        </p:spPr>
+        <p:txBody>
+          <a:bodyPr vert="horz" lIns="91440" tIns="45720" rIns="91440" bIns="45720" rtlCol="0"/>
+          <a:lstStyle>
+            <a:lvl1pPr algn="r">
+              <a:defRPr sz="1200"/>
+            </a:lvl1pPr>
+          </a:lstStyle>
+          <a:p>
+            <a:fld id="{1E0DE9F4-D20E-48FE-AF7E-95B2D59A1B59}" type="datetimeFigureOut">
+              <a:rPr lang="hu-HU" smtClean="0"/>
+              <a:t>2020.10.01.</a:t>
+            </a:fld>
+            <a:endParaRPr lang="hu-HU"/>
+          </a:p>
+        </p:txBody>
+      </p:sp>
+      <p:sp>
+        <p:nvSpPr>
+          <p:cNvPr id="4" name="Slide Image Placeholder 3"/>
+          <p:cNvSpPr>
+            <a:spLocks noGrp="1" noRot="1" noChangeAspect="1"/>
+          </p:cNvSpPr>
+          <p:nvPr>
+            <p:ph type="sldImg" idx="2"/>
+          </p:nvPr>
+        </p:nvSpPr>
+        <p:spPr>
+          <a:xfrm>
+            <a:off x="1143000" y="685800"/>
+            <a:ext cx="4572000" cy="3429000"/>
+          </a:xfrm>
+          <a:prstGeom prst="rect">
+            <a:avLst/>
+          </a:prstGeom>
+          <a:noFill/>
+          <a:ln w="12700">
+            <a:solidFill>
+              <a:prstClr val="black"/>
+            </a:solidFill>
+          </a:ln>
+        </p:spPr>
+        <p:txBody>
+          <a:bodyPr vert="horz" lIns="91440" tIns="45720" rIns="91440" bIns="45720" rtlCol="0" anchor="ctr"/>
+          <a:lstStyle/>
+          <a:p>
+            <a:endParaRPr lang="hu-HU"/>
+          </a:p>
+        </p:txBody>
+      </p:sp>
+      <p:sp>
+        <p:nvSpPr>
+          <p:cNvPr id="5" name="Notes Placeholder 4"/>
+          <p:cNvSpPr>
+            <a:spLocks noGrp="1"/>
+          </p:cNvSpPr>
+          <p:nvPr>
+            <p:ph type="body" sz="quarter" idx="3"/>
+          </p:nvPr>
+        </p:nvSpPr>
+        <p:spPr>
+          <a:xfrm>
+            <a:off x="685800" y="4343400"/>
+            <a:ext cx="5486400" cy="4114800"/>
+          </a:xfrm>
+          <a:prstGeom prst="rect">
+            <a:avLst/>
+          </a:prstGeom>
+        </p:spPr>
+        <p:txBody>
+          <a:bodyPr vert="horz" lIns="91440" tIns="45720" rIns="91440" bIns="45720" rtlCol="0"/>
+          <a:lstStyle/>
+          <a:p>
+            <a:pPr lvl="0"/>
+            <a:r>
+              <a:rPr lang="en-US" smtClean="0"/>
+              <a:t>Click to edit Master text styles</a:t>
+            </a:r>
+          </a:p>
+          <a:p>
+            <a:pPr lvl="1"/>
+            <a:r>
+              <a:rPr lang="en-US" smtClean="0"/>
+              <a:t>Second level</a:t>
+            </a:r>
+          </a:p>
+          <a:p>
+            <a:pPr lvl="2"/>
+            <a:r>
+              <a:rPr lang="en-US" smtClean="0"/>
+              <a:t>Third level</a:t>
+            </a:r>
+          </a:p>
+          <a:p>
+            <a:pPr lvl="3"/>
+            <a:r>
+              <a:rPr lang="en-US" smtClean="0"/>
+              <a:t>Fourth level</a:t>
+            </a:r>
+          </a:p>
+          <a:p>
+            <a:pPr lvl="4"/>
+            <a:r>
+              <a:rPr lang="en-US" smtClean="0"/>
+              <a:t>Fifth level</a:t>
+            </a:r>
+            <a:endParaRPr lang="hu-HU"/>
+          </a:p>
+        </p:txBody>
+      </p:sp>
+      <p:sp>
+        <p:nvSpPr>
+          <p:cNvPr id="6" name="Footer Placeholder 5"/>
+          <p:cNvSpPr>
+            <a:spLocks noGrp="1"/>
+          </p:cNvSpPr>
+          <p:nvPr>
+            <p:ph type="ftr" sz="quarter" idx="4"/>
+          </p:nvPr>
+        </p:nvSpPr>
+        <p:spPr>
+          <a:xfrm>
+            <a:off x="0" y="8685213"/>
+            <a:ext cx="2971800" cy="457200"/>
+          </a:xfrm>
+          <a:prstGeom prst="rect">
+            <a:avLst/>
+          </a:prstGeom>
+        </p:spPr>
+        <p:txBody>
+          <a:bodyPr vert="horz" lIns="91440" tIns="45720" rIns="91440" bIns="45720" rtlCol="0" anchor="b"/>
+          <a:lstStyle>
+            <a:lvl1pPr algn="l">
+              <a:defRPr sz="1200"/>
+            </a:lvl1pPr>
+          </a:lstStyle>
+          <a:p>
+            <a:endParaRPr lang="hu-HU"/>
+          </a:p>
+        </p:txBody>
+      </p:sp>
+      <p:sp>
+        <p:nvSpPr>
+          <p:cNvPr id="7" name="Slide Number Placeholder 6"/>
+          <p:cNvSpPr>
+            <a:spLocks noGrp="1"/>
+          </p:cNvSpPr>
+          <p:nvPr>
+            <p:ph type="sldNum" sz="quarter" idx="5"/>
+          </p:nvPr>
+        </p:nvSpPr>
+        <p:spPr>
+          <a:xfrm>
+            <a:off x="3884613" y="8685213"/>
+            <a:ext cx="2971800" cy="457200"/>
+          </a:xfrm>
+          <a:prstGeom prst="rect">
+            <a:avLst/>
+          </a:prstGeom>
+        </p:spPr>
+        <p:txBody>
+          <a:bodyPr vert="horz" lIns="91440" tIns="45720" rIns="91440" bIns="45720" rtlCol="0" anchor="b"/>
+          <a:lstStyle>
+            <a:lvl1pPr algn="r">
+              <a:defRPr sz="1200"/>
+            </a:lvl1pPr>
+          </a:lstStyle>
+          <a:p>
+            <a:fld id="{C3685EF7-94B5-460B-B3EC-575F84B96649}" type="slidenum">
+              <a:rPr lang="hu-HU" smtClean="0"/>
+              <a:t>‹#›</a:t>
+            </a:fld>
+            <a:endParaRPr lang="hu-HU"/>
+          </a:p>
+        </p:txBody>
+      </p:sp>
+    </p:spTree>
+    <p:extLst>
+      <p:ext uri="{BB962C8B-B14F-4D97-AF65-F5344CB8AC3E}">
+        <p14:creationId xmlns:p14="http://schemas.microsoft.com/office/powerpoint/2010/main" val="2185375721"/>
+      </p:ext>
+    </p:extLst>
+  </p:cSld>
+  <p:clrMap bg1="lt1" tx1="dk1" bg2="lt2" tx2="dk2" accent1="accent1" accent2="accent2" accent3="accent3" accent4="accent4" accent5="accent5" accent6="accent6" hlink="hlink" folHlink="folHlink"/>
+  <p:notesStyle>
+    <a:lvl1pPr marL="0" algn="l" defTabSz="914400" rtl="0" eaLnBrk="1" latinLnBrk="0" hangingPunct="1">
+      <a:defRPr sz="1200" kern="1200">
+        <a:solidFill>
+          <a:schemeClr val="tx1"/>
+        </a:solidFill>
+        <a:latin typeface="+mn-lt"/>
+        <a:ea typeface="+mn-ea"/>
+        <a:cs typeface="+mn-cs"/>
+      </a:defRPr>
+    </a:lvl1pPr>
+    <a:lvl2pPr marL="457200" algn="l" defTabSz="914400" rtl="0" eaLnBrk="1" latinLnBrk="0" hangingPunct="1">
+      <a:defRPr sz="1200" kern="1200">
+        <a:solidFill>
+          <a:schemeClr val="tx1"/>
+        </a:solidFill>
+        <a:latin typeface="+mn-lt"/>
+        <a:ea typeface="+mn-ea"/>
+        <a:cs typeface="+mn-cs"/>
+      </a:defRPr>
+    </a:lvl2pPr>
+    <a:lvl3pPr marL="914400" algn="l" defTabSz="914400" rtl="0" eaLnBrk="1" latinLnBrk="0" hangingPunct="1">
+      <a:defRPr sz="1200" kern="1200">
+        <a:solidFill>
+          <a:schemeClr val="tx1"/>
+        </a:solidFill>
+        <a:latin typeface="+mn-lt"/>
+        <a:ea typeface="+mn-ea"/>
+        <a:cs typeface="+mn-cs"/>
+      </a:defRPr>
+    </a:lvl3pPr>
+    <a:lvl4pPr marL="1371600" algn="l" defTabSz="914400" rtl="0" eaLnBrk="1" latinLnBrk="0" hangingPunct="1">
+      <a:defRPr sz="1200" kern="1200">
+        <a:solidFill>
+          <a:schemeClr val="tx1"/>
+        </a:solidFill>
+        <a:latin typeface="+mn-lt"/>
+        <a:ea typeface="+mn-ea"/>
+        <a:cs typeface="+mn-cs"/>
+      </a:defRPr>
+    </a:lvl4pPr>
+    <a:lvl5pPr marL="1828800" algn="l" defTabSz="914400" rtl="0" eaLnBrk="1" latinLnBrk="0" hangingPunct="1">
+      <a:defRPr sz="1200" kern="1200">
+        <a:solidFill>
+          <a:schemeClr val="tx1"/>
+        </a:solidFill>
+        <a:latin typeface="+mn-lt"/>
+        <a:ea typeface="+mn-ea"/>
+        <a:cs typeface="+mn-cs"/>
+      </a:defRPr>
+    </a:lvl5pPr>
+    <a:lvl6pPr marL="2286000" algn="l" defTabSz="914400" rtl="0" eaLnBrk="1" latinLnBrk="0" hangingPunct="1">
+      <a:defRPr sz="1200" kern="1200">
+        <a:solidFill>
+          <a:schemeClr val="tx1"/>
+        </a:solidFill>
+        <a:latin typeface="+mn-lt"/>
+        <a:ea typeface="+mn-ea"/>
+        <a:cs typeface="+mn-cs"/>
+      </a:defRPr>
+    </a:lvl6pPr>
+    <a:lvl7pPr marL="2743200" algn="l" defTabSz="914400" rtl="0" eaLnBrk="1" latinLnBrk="0" hangingPunct="1">
+      <a:defRPr sz="1200" kern="1200">
+        <a:solidFill>
+          <a:schemeClr val="tx1"/>
+        </a:solidFill>
+        <a:latin typeface="+mn-lt"/>
+        <a:ea typeface="+mn-ea"/>
+        <a:cs typeface="+mn-cs"/>
+      </a:defRPr>
+    </a:lvl7pPr>
+    <a:lvl8pPr marL="3200400" algn="l" defTabSz="914400" rtl="0" eaLnBrk="1" latinLnBrk="0" hangingPunct="1">
+      <a:defRPr sz="1200" kern="1200">
+        <a:solidFill>
+          <a:schemeClr val="tx1"/>
+        </a:solidFill>
+        <a:latin typeface="+mn-lt"/>
+        <a:ea typeface="+mn-ea"/>
+        <a:cs typeface="+mn-cs"/>
+      </a:defRPr>
+    </a:lvl8pPr>
+    <a:lvl9pPr marL="3657600" algn="l" defTabSz="914400" rtl="0" eaLnBrk="1" latinLnBrk="0" hangingPunct="1">
+      <a:defRPr sz="1200" kern="1200">
+        <a:solidFill>
+          <a:schemeClr val="tx1"/>
+        </a:solidFill>
+        <a:latin typeface="+mn-lt"/>
+        <a:ea typeface="+mn-ea"/>
+        <a:cs typeface="+mn-cs"/>
+      </a:defRPr>
+    </a:lvl9pPr>
+  </p:notesStyle>
+</p:notesMaster>
+</file>
+
+<file path=ppt/notesSlides/notesSlide1.xml><?xml version="1.0" encoding="utf-8"?>
+<p:notes xmlns:a="http://schemas.openxmlformats.org/drawingml/2006/main" xmlns:r="http://schemas.openxmlformats.org/officeDocument/2006/relationships" xmlns:p="http://schemas.openxmlformats.org/presentationml/2006/main">
+  <p:cSld>
+    <p:spTree>
+      <p:nvGrpSpPr>
+        <p:cNvPr id="1" name=""/>
+        <p:cNvGrpSpPr/>
+        <p:nvPr/>
+      </p:nvGrpSpPr>
+      <p:grpSpPr>
+        <a:xfrm>
+          <a:off x="0" y="0"/>
+          <a:ext cx="0" cy="0"/>
+          <a:chOff x="0" y="0"/>
+          <a:chExt cx="0" cy="0"/>
+        </a:xfrm>
+      </p:grpSpPr>
+      <p:sp>
+        <p:nvSpPr>
+          <p:cNvPr id="2" name="Slide Image Placeholder 1"/>
+          <p:cNvSpPr>
+            <a:spLocks noGrp="1" noRot="1" noChangeAspect="1"/>
+          </p:cNvSpPr>
+          <p:nvPr>
+            <p:ph type="sldImg"/>
+          </p:nvPr>
+        </p:nvSpPr>
+        <p:spPr/>
+      </p:sp>
+      <p:sp>
+        <p:nvSpPr>
+          <p:cNvPr id="3" name="Notes Placeholder 2"/>
+          <p:cNvSpPr>
+            <a:spLocks noGrp="1"/>
+          </p:cNvSpPr>
+          <p:nvPr>
+            <p:ph type="body" idx="1"/>
+          </p:nvPr>
+        </p:nvSpPr>
+        <p:spPr/>
+        <p:txBody>
+          <a:bodyPr/>
+          <a:lstStyle/>
+          <a:p>
+            <a:endParaRPr lang="hu-HU"/>
+          </a:p>
+        </p:txBody>
+      </p:sp>
+      <p:sp>
+        <p:nvSpPr>
+          <p:cNvPr id="4" name="Slide Number Placeholder 3"/>
+          <p:cNvSpPr>
+            <a:spLocks noGrp="1"/>
+          </p:cNvSpPr>
+          <p:nvPr>
+            <p:ph type="sldNum" sz="quarter" idx="10"/>
+          </p:nvPr>
+        </p:nvSpPr>
+        <p:spPr/>
+        <p:txBody>
+          <a:bodyPr/>
+          <a:lstStyle/>
+          <a:p>
+            <a:fld id="{C3685EF7-94B5-460B-B3EC-575F84B96649}" type="slidenum">
+              <a:rPr lang="hu-HU" smtClean="0"/>
+              <a:t>2</a:t>
+            </a:fld>
+            <a:endParaRPr lang="hu-HU"/>
+          </a:p>
+        </p:txBody>
+      </p:sp>
+    </p:spTree>
+    <p:extLst>
+      <p:ext uri="{BB962C8B-B14F-4D97-AF65-F5344CB8AC3E}">
+        <p14:creationId xmlns:p14="http://schemas.microsoft.com/office/powerpoint/2010/main" val="2477533798"/>
+      </p:ext>
+    </p:extLst>
+  </p:cSld>
+  <p:clrMapOvr>
+    <a:masterClrMapping/>
+  </p:clrMapOvr>
+</p:notes>
 </file>
 
 <file path=ppt/slideLayouts/slideLayout1.xml><?xml version="1.0" encoding="utf-8"?>
@@ -744,10 +1180,9 @@
             <a:extLst/>
           </a:lstStyle>
           <a:p>
-            <a:fld id="{1D8BD707-D9CF-40AE-B4C6-C98DA3205C09}" type="datetimeFigureOut">
-              <a:rPr lang="en-US" smtClean="0"/>
-              <a:pPr/>
-              <a:t>9/30/2020</a:t>
+            <a:fld id="{B5F06806-D445-4F51-A92A-B947DEA050D7}" type="datetime1">
+              <a:rPr lang="en-US" smtClean="0"/>
+              <a:t>10/1/2020</a:t>
             </a:fld>
             <a:endParaRPr lang="en-US"/>
           </a:p>
@@ -779,6 +1214,10 @@
             <a:extLst/>
           </a:lstStyle>
           <a:p>
+            <a:r>
+              <a:rPr lang="en-US" smtClean="0"/>
+              <a:t>3/14</a:t>
+            </a:r>
             <a:endParaRPr lang="en-US"/>
           </a:p>
         </p:txBody>
@@ -942,10 +1381,9 @@
             <a:extLst/>
           </a:lstStyle>
           <a:p>
-            <a:fld id="{1D8BD707-D9CF-40AE-B4C6-C98DA3205C09}" type="datetimeFigureOut">
-              <a:rPr lang="en-US" smtClean="0"/>
-              <a:pPr/>
-              <a:t>9/30/2020</a:t>
+            <a:fld id="{04F4AC02-FD82-4E50-8F90-5BA63BF43841}" type="datetime1">
+              <a:rPr lang="en-US" smtClean="0"/>
+              <a:t>10/1/2020</a:t>
             </a:fld>
             <a:endParaRPr lang="en-US"/>
           </a:p>
@@ -968,6 +1406,10 @@
             <a:extLst/>
           </a:lstStyle>
           <a:p>
+            <a:r>
+              <a:rPr lang="en-US" smtClean="0"/>
+              <a:t>3/14</a:t>
+            </a:r>
             <a:endParaRPr lang="en-US"/>
           </a:p>
         </p:txBody>
@@ -1129,10 +1571,9 @@
             <a:extLst/>
           </a:lstStyle>
           <a:p>
-            <a:fld id="{1D8BD707-D9CF-40AE-B4C6-C98DA3205C09}" type="datetimeFigureOut">
-              <a:rPr lang="en-US" smtClean="0"/>
-              <a:pPr/>
-              <a:t>9/30/2020</a:t>
+            <a:fld id="{C3DD1971-14C6-4F23-AD8E-5660C5816011}" type="datetime1">
+              <a:rPr lang="en-US" smtClean="0"/>
+              <a:t>10/1/2020</a:t>
             </a:fld>
             <a:endParaRPr lang="en-US"/>
           </a:p>
@@ -1155,6 +1596,10 @@
             <a:extLst/>
           </a:lstStyle>
           <a:p>
+            <a:r>
+              <a:rPr lang="en-US" smtClean="0"/>
+              <a:t>3/14</a:t>
+            </a:r>
             <a:endParaRPr lang="en-US"/>
           </a:p>
         </p:txBody>
@@ -1281,10 +1726,9 @@
             <a:extLst/>
           </a:lstStyle>
           <a:p>
-            <a:fld id="{1D8BD707-D9CF-40AE-B4C6-C98DA3205C09}" type="datetimeFigureOut">
-              <a:rPr lang="en-US" smtClean="0"/>
-              <a:pPr/>
-              <a:t>9/30/2020</a:t>
+            <a:fld id="{764F172E-3354-4403-8E73-B8A72FFD2C31}" type="datetime1">
+              <a:rPr lang="en-US" smtClean="0"/>
+              <a:t>10/1/2020</a:t>
             </a:fld>
             <a:endParaRPr lang="en-US"/>
           </a:p>
@@ -1307,6 +1751,10 @@
             <a:extLst/>
           </a:lstStyle>
           <a:p>
+            <a:r>
+              <a:rPr lang="en-US" smtClean="0"/>
+              <a:t>3/14</a:t>
+            </a:r>
             <a:endParaRPr lang="en-US"/>
           </a:p>
         </p:txBody>
@@ -1533,10 +1981,9 @@
             <a:extLst/>
           </a:lstStyle>
           <a:p>
-            <a:fld id="{1D8BD707-D9CF-40AE-B4C6-C98DA3205C09}" type="datetimeFigureOut">
-              <a:rPr lang="en-US" smtClean="0"/>
-              <a:pPr/>
-              <a:t>9/30/2020</a:t>
+            <a:fld id="{F897B272-8CC8-4E30-8E45-CB94063D203D}" type="datetime1">
+              <a:rPr lang="en-US" smtClean="0"/>
+              <a:t>10/1/2020</a:t>
             </a:fld>
             <a:endParaRPr lang="en-US"/>
           </a:p>
@@ -1559,6 +2006,10 @@
             <a:extLst/>
           </a:lstStyle>
           <a:p>
+            <a:r>
+              <a:rPr lang="en-US" smtClean="0"/>
+              <a:t>3/14</a:t>
+            </a:r>
             <a:endParaRPr lang="en-US"/>
           </a:p>
         </p:txBody>
@@ -1939,10 +2390,9 @@
             <a:extLst/>
           </a:lstStyle>
           <a:p>
-            <a:fld id="{1D8BD707-D9CF-40AE-B4C6-C98DA3205C09}" type="datetimeFigureOut">
-              <a:rPr lang="en-US" smtClean="0"/>
-              <a:pPr/>
-              <a:t>9/30/2020</a:t>
+            <a:fld id="{46A5C5E2-9319-48C3-96D8-973EBEA9AC20}" type="datetime1">
+              <a:rPr lang="en-US" smtClean="0"/>
+              <a:t>10/1/2020</a:t>
             </a:fld>
             <a:endParaRPr lang="en-US"/>
           </a:p>
@@ -1965,6 +2415,10 @@
             <a:extLst/>
           </a:lstStyle>
           <a:p>
+            <a:r>
+              <a:rPr lang="en-US" smtClean="0"/>
+              <a:t>3/14</a:t>
+            </a:r>
             <a:endParaRPr lang="en-US"/>
           </a:p>
         </p:txBody>
@@ -2382,10 +2836,9 @@
             <a:extLst/>
           </a:lstStyle>
           <a:p>
-            <a:fld id="{1D8BD707-D9CF-40AE-B4C6-C98DA3205C09}" type="datetimeFigureOut">
-              <a:rPr lang="en-US" smtClean="0"/>
-              <a:pPr/>
-              <a:t>9/30/2020</a:t>
+            <a:fld id="{55ACC61C-2D8F-4038-A89F-A9D9142857C4}" type="datetime1">
+              <a:rPr lang="en-US" smtClean="0"/>
+              <a:t>10/1/2020</a:t>
             </a:fld>
             <a:endParaRPr lang="en-US"/>
           </a:p>
@@ -2408,6 +2861,10 @@
             <a:extLst/>
           </a:lstStyle>
           <a:p>
+            <a:r>
+              <a:rPr lang="en-US" smtClean="0"/>
+              <a:t>3/14</a:t>
+            </a:r>
             <a:endParaRPr lang="en-US"/>
           </a:p>
         </p:txBody>
@@ -2480,10 +2937,9 @@
             <a:extLst/>
           </a:lstStyle>
           <a:p>
-            <a:fld id="{1D8BD707-D9CF-40AE-B4C6-C98DA3205C09}" type="datetimeFigureOut">
-              <a:rPr lang="en-US" smtClean="0"/>
-              <a:pPr/>
-              <a:t>9/30/2020</a:t>
+            <a:fld id="{DF015262-A273-4DE8-8484-BDB3D803F99A}" type="datetime1">
+              <a:rPr lang="en-US" smtClean="0"/>
+              <a:t>10/1/2020</a:t>
             </a:fld>
             <a:endParaRPr lang="en-US"/>
           </a:p>
@@ -2506,6 +2962,10 @@
             <a:extLst/>
           </a:lstStyle>
           <a:p>
+            <a:r>
+              <a:rPr lang="en-US" smtClean="0"/>
+              <a:t>3/14</a:t>
+            </a:r>
             <a:endParaRPr lang="en-US"/>
           </a:p>
         </p:txBody>
@@ -2603,10 +3063,9 @@
             <a:extLst/>
           </a:lstStyle>
           <a:p>
-            <a:fld id="{1D8BD707-D9CF-40AE-B4C6-C98DA3205C09}" type="datetimeFigureOut">
-              <a:rPr lang="en-US" smtClean="0"/>
-              <a:pPr/>
-              <a:t>9/30/2020</a:t>
+            <a:fld id="{FC5AD73B-2A16-4064-8A39-875F15887D4A}" type="datetime1">
+              <a:rPr lang="en-US" smtClean="0"/>
+              <a:t>10/1/2020</a:t>
             </a:fld>
             <a:endParaRPr lang="en-US"/>
           </a:p>
@@ -2629,6 +3088,10 @@
             <a:extLst/>
           </a:lstStyle>
           <a:p>
+            <a:r>
+              <a:rPr lang="en-US" smtClean="0"/>
+              <a:t>3/14</a:t>
+            </a:r>
             <a:endParaRPr lang="en-US"/>
           </a:p>
         </p:txBody>
@@ -2874,10 +3337,9 @@
             <a:extLst/>
           </a:lstStyle>
           <a:p>
-            <a:fld id="{1D8BD707-D9CF-40AE-B4C6-C98DA3205C09}" type="datetimeFigureOut">
-              <a:rPr lang="en-US" smtClean="0"/>
-              <a:pPr/>
-              <a:t>9/30/2020</a:t>
+            <a:fld id="{92177F06-E80D-4F79-A841-B1D481DE7689}" type="datetime1">
+              <a:rPr lang="en-US" smtClean="0"/>
+              <a:t>10/1/2020</a:t>
             </a:fld>
             <a:endParaRPr lang="en-US"/>
           </a:p>
@@ -2900,6 +3362,10 @@
             <a:extLst/>
           </a:lstStyle>
           <a:p>
+            <a:r>
+              <a:rPr lang="en-US" smtClean="0"/>
+              <a:t>3/14</a:t>
+            </a:r>
             <a:endParaRPr lang="en-US"/>
           </a:p>
         </p:txBody>
@@ -3076,10 +3542,9 @@
             <a:extLst/>
           </a:lstStyle>
           <a:p>
-            <a:fld id="{1D8BD707-D9CF-40AE-B4C6-C98DA3205C09}" type="datetimeFigureOut">
-              <a:rPr lang="en-US" smtClean="0"/>
-              <a:pPr/>
-              <a:t>9/30/2020</a:t>
+            <a:fld id="{2966C9F4-A17D-4BA2-835D-46BFC0B933E8}" type="datetime1">
+              <a:rPr lang="en-US" smtClean="0"/>
+              <a:t>10/1/2020</a:t>
             </a:fld>
             <a:endParaRPr lang="en-US"/>
           </a:p>
@@ -3114,6 +3579,10 @@
             <a:extLst/>
           </a:lstStyle>
           <a:p>
+            <a:r>
+              <a:rPr lang="en-US" smtClean="0"/>
+              <a:t>3/14</a:t>
+            </a:r>
             <a:endParaRPr lang="en-US"/>
           </a:p>
         </p:txBody>
@@ -4190,10 +4659,9 @@
             <a:extLst/>
           </a:lstStyle>
           <a:p>
-            <a:fld id="{1D8BD707-D9CF-40AE-B4C6-C98DA3205C09}" type="datetimeFigureOut">
-              <a:rPr lang="en-US" smtClean="0"/>
-              <a:pPr/>
-              <a:t>9/30/2020</a:t>
+            <a:fld id="{1C036572-71D7-4E23-91C8-F6CC0EC65C2F}" type="datetime1">
+              <a:rPr lang="en-US" smtClean="0"/>
+              <a:t>10/1/2020</a:t>
             </a:fld>
             <a:endParaRPr lang="en-US"/>
           </a:p>
@@ -4231,6 +4699,10 @@
             <a:extLst/>
           </a:lstStyle>
           <a:p>
+            <a:r>
+              <a:rPr lang="en-US" smtClean="0"/>
+              <a:t>3/14</a:t>
+            </a:r>
             <a:endParaRPr lang="en-US"/>
           </a:p>
         </p:txBody>
@@ -4292,6 +4764,7 @@
     <p:sldLayoutId id="2147483682" r:id="rId10"/>
     <p:sldLayoutId id="2147483683" r:id="rId11"/>
   </p:sldLayoutIdLst>
+  <p:hf sldNum="0" hdr="0" dt="0"/>
   <p:txStyles>
     <p:titleStyle>
       <a:lvl1pPr algn="l" rtl="0" eaLnBrk="1" latinLnBrk="0" hangingPunct="1">
@@ -4733,6 +5206,131 @@
           </a:p>
         </p:txBody>
       </p:sp>
+      <p:sp>
+        <p:nvSpPr>
+          <p:cNvPr id="6" name="TextBox 5"/>
+          <p:cNvSpPr txBox="1"/>
+          <p:nvPr/>
+        </p:nvSpPr>
+        <p:spPr>
+          <a:xfrm>
+            <a:off x="3200400" y="6525999"/>
+            <a:ext cx="2743200" cy="369332"/>
+          </a:xfrm>
+          <a:prstGeom prst="rect">
+            <a:avLst/>
+          </a:prstGeom>
+          <a:noFill/>
+        </p:spPr>
+        <p:txBody>
+          <a:bodyPr wrap="square" rtlCol="0">
+            <a:spAutoFit/>
+          </a:bodyPr>
+          <a:lstStyle>
+            <a:defPPr>
+              <a:defRPr lang="en-US"/>
+            </a:defPPr>
+            <a:lvl1pPr marL="0" algn="l" defTabSz="914400" rtl="0" eaLnBrk="1" latinLnBrk="0" hangingPunct="1">
+              <a:defRPr sz="1800" kern="1200">
+                <a:solidFill>
+                  <a:schemeClr val="tx1"/>
+                </a:solidFill>
+                <a:latin typeface="+mn-lt"/>
+                <a:ea typeface="+mn-ea"/>
+                <a:cs typeface="+mn-cs"/>
+              </a:defRPr>
+            </a:lvl1pPr>
+            <a:lvl2pPr marL="457200" algn="l" defTabSz="914400" rtl="0" eaLnBrk="1" latinLnBrk="0" hangingPunct="1">
+              <a:defRPr sz="1800" kern="1200">
+                <a:solidFill>
+                  <a:schemeClr val="tx1"/>
+                </a:solidFill>
+                <a:latin typeface="+mn-lt"/>
+                <a:ea typeface="+mn-ea"/>
+                <a:cs typeface="+mn-cs"/>
+              </a:defRPr>
+            </a:lvl2pPr>
+            <a:lvl3pPr marL="914400" algn="l" defTabSz="914400" rtl="0" eaLnBrk="1" latinLnBrk="0" hangingPunct="1">
+              <a:defRPr sz="1800" kern="1200">
+                <a:solidFill>
+                  <a:schemeClr val="tx1"/>
+                </a:solidFill>
+                <a:latin typeface="+mn-lt"/>
+                <a:ea typeface="+mn-ea"/>
+                <a:cs typeface="+mn-cs"/>
+              </a:defRPr>
+            </a:lvl3pPr>
+            <a:lvl4pPr marL="1371600" algn="l" defTabSz="914400" rtl="0" eaLnBrk="1" latinLnBrk="0" hangingPunct="1">
+              <a:defRPr sz="1800" kern="1200">
+                <a:solidFill>
+                  <a:schemeClr val="tx1"/>
+                </a:solidFill>
+                <a:latin typeface="+mn-lt"/>
+                <a:ea typeface="+mn-ea"/>
+                <a:cs typeface="+mn-cs"/>
+              </a:defRPr>
+            </a:lvl4pPr>
+            <a:lvl5pPr marL="1828800" algn="l" defTabSz="914400" rtl="0" eaLnBrk="1" latinLnBrk="0" hangingPunct="1">
+              <a:defRPr sz="1800" kern="1200">
+                <a:solidFill>
+                  <a:schemeClr val="tx1"/>
+                </a:solidFill>
+                <a:latin typeface="+mn-lt"/>
+                <a:ea typeface="+mn-ea"/>
+                <a:cs typeface="+mn-cs"/>
+              </a:defRPr>
+            </a:lvl5pPr>
+            <a:lvl6pPr marL="2286000" algn="l" defTabSz="914400" rtl="0" eaLnBrk="1" latinLnBrk="0" hangingPunct="1">
+              <a:defRPr sz="1800" kern="1200">
+                <a:solidFill>
+                  <a:schemeClr val="tx1"/>
+                </a:solidFill>
+                <a:latin typeface="+mn-lt"/>
+                <a:ea typeface="+mn-ea"/>
+                <a:cs typeface="+mn-cs"/>
+              </a:defRPr>
+            </a:lvl6pPr>
+            <a:lvl7pPr marL="2743200" algn="l" defTabSz="914400" rtl="0" eaLnBrk="1" latinLnBrk="0" hangingPunct="1">
+              <a:defRPr sz="1800" kern="1200">
+                <a:solidFill>
+                  <a:schemeClr val="tx1"/>
+                </a:solidFill>
+                <a:latin typeface="+mn-lt"/>
+                <a:ea typeface="+mn-ea"/>
+                <a:cs typeface="+mn-cs"/>
+              </a:defRPr>
+            </a:lvl7pPr>
+            <a:lvl8pPr marL="3200400" algn="l" defTabSz="914400" rtl="0" eaLnBrk="1" latinLnBrk="0" hangingPunct="1">
+              <a:defRPr sz="1800" kern="1200">
+                <a:solidFill>
+                  <a:schemeClr val="tx1"/>
+                </a:solidFill>
+                <a:latin typeface="+mn-lt"/>
+                <a:ea typeface="+mn-ea"/>
+                <a:cs typeface="+mn-cs"/>
+              </a:defRPr>
+            </a:lvl8pPr>
+            <a:lvl9pPr marL="3657600" algn="l" defTabSz="914400" rtl="0" eaLnBrk="1" latinLnBrk="0" hangingPunct="1">
+              <a:defRPr sz="1800" kern="1200">
+                <a:solidFill>
+                  <a:schemeClr val="tx1"/>
+                </a:solidFill>
+                <a:latin typeface="+mn-lt"/>
+                <a:ea typeface="+mn-ea"/>
+                <a:cs typeface="+mn-cs"/>
+              </a:defRPr>
+            </a:lvl9pPr>
+          </a:lstStyle>
+          <a:p>
+            <a:pPr algn="ctr"/>
+            <a:r>
+              <a:rPr lang="hu-HU" dirty="0" smtClean="0"/>
+              <a:t>2020.10.01.</a:t>
+            </a:r>
+            <a:endParaRPr lang="hu-HU" dirty="0"/>
+          </a:p>
+        </p:txBody>
+      </p:sp>
     </p:spTree>
     <p:extLst>
       <p:ext uri="{BB962C8B-B14F-4D97-AF65-F5344CB8AC3E}">
@@ -4743,6 +5341,13 @@
   <p:clrMapOvr>
     <a:masterClrMapping/>
   </p:clrMapOvr>
+  <p:timing>
+    <p:tnLst>
+      <p:par>
+        <p:cTn id="1" dur="indefinite" restart="never" nodeType="tmRoot"/>
+      </p:par>
+    </p:tnLst>
+  </p:timing>
 </p:sld>
 </file>
 
@@ -4811,7 +5416,7 @@
       </p:sp>
       <p:pic>
         <p:nvPicPr>
-          <p:cNvPr id="5122" name="Picture 2"/>
+          <p:cNvPr id="5123" name="Picture 3"/>
           <p:cNvPicPr>
             <a:picLocks noChangeAspect="1" noChangeArrowheads="1"/>
           </p:cNvPicPr>
@@ -4832,8 +5437,8 @@
         </p:blipFill>
         <p:spPr bwMode="auto">
           <a:xfrm>
-            <a:off x="1621177" y="2128467"/>
-            <a:ext cx="2106885" cy="3654915"/>
+            <a:off x="5365477" y="2197826"/>
+            <a:ext cx="2133600" cy="3585556"/>
           </a:xfrm>
           <a:prstGeom prst="rect">
             <a:avLst/>
@@ -4869,9 +5474,32 @@
           </a:extLst>
         </p:spPr>
       </p:pic>
+      <p:sp>
+        <p:nvSpPr>
+          <p:cNvPr id="5" name="Footer Placeholder 4"/>
+          <p:cNvSpPr>
+            <a:spLocks noGrp="1"/>
+          </p:cNvSpPr>
+          <p:nvPr>
+            <p:ph type="ftr" sz="quarter" idx="11"/>
+          </p:nvPr>
+        </p:nvSpPr>
+        <p:spPr/>
+        <p:txBody>
+          <a:bodyPr/>
+          <a:lstStyle/>
+          <a:p>
+            <a:r>
+              <a:rPr lang="en-US" smtClean="0"/>
+              <a:t>10/14</a:t>
+            </a:r>
+            <a:endParaRPr lang="en-US"/>
+          </a:p>
+        </p:txBody>
+      </p:sp>
       <p:pic>
         <p:nvPicPr>
-          <p:cNvPr id="5123" name="Picture 3"/>
+          <p:cNvPr id="2051" name="Picture 3"/>
           <p:cNvPicPr>
             <a:picLocks noChangeAspect="1" noChangeArrowheads="1"/>
           </p:cNvPicPr>
@@ -4892,8 +5520,8 @@
         </p:blipFill>
         <p:spPr bwMode="auto">
           <a:xfrm>
-            <a:off x="5389222" y="2197826"/>
-            <a:ext cx="2133600" cy="3585556"/>
+            <a:off x="1644923" y="2128467"/>
+            <a:ext cx="2075631" cy="3654916"/>
           </a:xfrm>
           <a:prstGeom prst="rect">
             <a:avLst/>
@@ -4950,209 +5578,6 @@
 </file>
 
 <file path=ppt/slides/slide11.xml><?xml version="1.0" encoding="utf-8"?>
-<p:sld xmlns:a="http://schemas.openxmlformats.org/drawingml/2006/main" xmlns:r="http://schemas.openxmlformats.org/officeDocument/2006/relationships" xmlns:p="http://schemas.openxmlformats.org/presentationml/2006/main">
-  <p:cSld>
-    <p:spTree>
-      <p:nvGrpSpPr>
-        <p:cNvPr id="1" name=""/>
-        <p:cNvGrpSpPr/>
-        <p:nvPr/>
-      </p:nvGrpSpPr>
-      <p:grpSpPr>
-        <a:xfrm>
-          <a:off x="0" y="0"/>
-          <a:ext cx="0" cy="0"/>
-          <a:chOff x="0" y="0"/>
-          <a:chExt cx="0" cy="0"/>
-        </a:xfrm>
-      </p:grpSpPr>
-      <p:sp>
-        <p:nvSpPr>
-          <p:cNvPr id="2" name="Content Placeholder 1"/>
-          <p:cNvSpPr>
-            <a:spLocks noGrp="1"/>
-          </p:cNvSpPr>
-          <p:nvPr>
-            <p:ph idx="1"/>
-          </p:nvPr>
-        </p:nvSpPr>
-        <p:spPr/>
-        <p:txBody>
-          <a:bodyPr/>
-          <a:lstStyle/>
-          <a:p>
-            <a:r>
-              <a:rPr lang="hu-HU" dirty="0" smtClean="0"/>
-              <a:t>Statikus részek</a:t>
-            </a:r>
-            <a:endParaRPr lang="hu-HU" dirty="0"/>
-          </a:p>
-        </p:txBody>
-      </p:sp>
-      <p:sp>
-        <p:nvSpPr>
-          <p:cNvPr id="3" name="Title 2"/>
-          <p:cNvSpPr>
-            <a:spLocks noGrp="1"/>
-          </p:cNvSpPr>
-          <p:nvPr>
-            <p:ph type="title"/>
-          </p:nvPr>
-        </p:nvSpPr>
-        <p:spPr/>
-        <p:txBody>
-          <a:bodyPr/>
-          <a:lstStyle/>
-          <a:p>
-            <a:r>
-              <a:rPr lang="hu-HU" dirty="0" smtClean="0"/>
-              <a:t>Az alkalmazás futása</a:t>
-            </a:r>
-            <a:endParaRPr lang="hu-HU" dirty="0"/>
-          </a:p>
-        </p:txBody>
-      </p:sp>
-      <p:pic>
-        <p:nvPicPr>
-          <p:cNvPr id="6146" name="Picture 2"/>
-          <p:cNvPicPr>
-            <a:picLocks noChangeAspect="1" noChangeArrowheads="1"/>
-          </p:cNvPicPr>
-          <p:nvPr/>
-        </p:nvPicPr>
-        <p:blipFill>
-          <a:blip r:embed="rId2">
-            <a:extLst>
-              <a:ext uri="{28A0092B-C50C-407E-A947-70E740481C1C}">
-                <a14:useLocalDpi xmlns:a14="http://schemas.microsoft.com/office/drawing/2010/main" val="0"/>
-              </a:ext>
-            </a:extLst>
-          </a:blip>
-          <a:srcRect/>
-          <a:stretch>
-            <a:fillRect/>
-          </a:stretch>
-        </p:blipFill>
-        <p:spPr bwMode="auto">
-          <a:xfrm>
-            <a:off x="1625600" y="1925820"/>
-            <a:ext cx="2133600" cy="3761415"/>
-          </a:xfrm>
-          <a:prstGeom prst="rect">
-            <a:avLst/>
-          </a:prstGeom>
-          <a:ln>
-            <a:noFill/>
-          </a:ln>
-          <a:effectLst>
-            <a:outerShdw blurRad="292100" dist="139700" dir="2700000" algn="tl" rotWithShape="0">
-              <a:srgbClr val="333333">
-                <a:alpha val="65000"/>
-              </a:srgbClr>
-            </a:outerShdw>
-          </a:effectLst>
-          <a:extLst>
-            <a:ext uri="{909E8E84-426E-40DD-AFC4-6F175D3DCCD1}">
-              <a14:hiddenFill xmlns:a14="http://schemas.microsoft.com/office/drawing/2010/main">
-                <a:solidFill>
-                  <a:schemeClr val="accent1"/>
-                </a:solidFill>
-              </a14:hiddenFill>
-            </a:ext>
-            <a:ext uri="{91240B29-F687-4F45-9708-019B960494DF}">
-              <a14:hiddenLine xmlns:a14="http://schemas.microsoft.com/office/drawing/2010/main" w="9525">
-                <a:solidFill>
-                  <a:schemeClr val="tx1"/>
-                </a:solidFill>
-                <a:miter lim="800000"/>
-                <a:headEnd/>
-                <a:tailEnd/>
-              </a14:hiddenLine>
-            </a:ext>
-          </a:extLst>
-        </p:spPr>
-      </p:pic>
-      <p:pic>
-        <p:nvPicPr>
-          <p:cNvPr id="6147" name="Picture 3"/>
-          <p:cNvPicPr>
-            <a:picLocks noChangeAspect="1" noChangeArrowheads="1"/>
-          </p:cNvPicPr>
-          <p:nvPr/>
-        </p:nvPicPr>
-        <p:blipFill>
-          <a:blip r:embed="rId3">
-            <a:extLst>
-              <a:ext uri="{28A0092B-C50C-407E-A947-70E740481C1C}">
-                <a14:useLocalDpi xmlns:a14="http://schemas.microsoft.com/office/drawing/2010/main" val="0"/>
-              </a:ext>
-            </a:extLst>
-          </a:blip>
-          <a:srcRect/>
-          <a:stretch>
-            <a:fillRect/>
-          </a:stretch>
-        </p:blipFill>
-        <p:spPr bwMode="auto">
-          <a:xfrm>
-            <a:off x="5384800" y="1925820"/>
-            <a:ext cx="2133600" cy="3789180"/>
-          </a:xfrm>
-          <a:prstGeom prst="rect">
-            <a:avLst/>
-          </a:prstGeom>
-          <a:ln>
-            <a:noFill/>
-          </a:ln>
-          <a:effectLst>
-            <a:outerShdw blurRad="292100" dist="139700" dir="2700000" algn="tl" rotWithShape="0">
-              <a:srgbClr val="333333">
-                <a:alpha val="65000"/>
-              </a:srgbClr>
-            </a:outerShdw>
-          </a:effectLst>
-          <a:extLst>
-            <a:ext uri="{909E8E84-426E-40DD-AFC4-6F175D3DCCD1}">
-              <a14:hiddenFill xmlns:a14="http://schemas.microsoft.com/office/drawing/2010/main">
-                <a:solidFill>
-                  <a:schemeClr val="accent1"/>
-                </a:solidFill>
-              </a14:hiddenFill>
-            </a:ext>
-            <a:ext uri="{91240B29-F687-4F45-9708-019B960494DF}">
-              <a14:hiddenLine xmlns:a14="http://schemas.microsoft.com/office/drawing/2010/main" w="9525">
-                <a:solidFill>
-                  <a:schemeClr val="tx1"/>
-                </a:solidFill>
-                <a:miter lim="800000"/>
-                <a:headEnd/>
-                <a:tailEnd/>
-              </a14:hiddenLine>
-            </a:ext>
-          </a:extLst>
-        </p:spPr>
-      </p:pic>
-    </p:spTree>
-    <p:extLst>
-      <p:ext uri="{BB962C8B-B14F-4D97-AF65-F5344CB8AC3E}">
-        <p14:creationId xmlns:p14="http://schemas.microsoft.com/office/powerpoint/2010/main" val="2820327650"/>
-      </p:ext>
-    </p:extLst>
-  </p:cSld>
-  <p:clrMapOvr>
-    <a:masterClrMapping/>
-  </p:clrMapOvr>
-  <p:timing>
-    <p:tnLst>
-      <p:par>
-        <p:cTn id="1" dur="indefinite" restart="never" nodeType="tmRoot"/>
-      </p:par>
-    </p:tnLst>
-  </p:timing>
-</p:sld>
-</file>
-
-<file path=ppt/slides/slide12.xml><?xml version="1.0" encoding="utf-8"?>
 <p:sld xmlns:a="http://schemas.openxmlformats.org/drawingml/2006/main" xmlns:r="http://schemas.openxmlformats.org/officeDocument/2006/relationships" xmlns:p="http://schemas.openxmlformats.org/presentationml/2006/main">
   <p:cSld>
     <p:spTree>
@@ -5304,10 +5729,16 @@
           <a:prstGeom prst="rect">
             <a:avLst/>
           </a:prstGeom>
-          <a:noFill/>
           <a:ln>
             <a:noFill/>
           </a:ln>
+          <a:effectLst>
+            <a:outerShdw blurRad="292100" dist="139700" dir="2700000" algn="tl" rotWithShape="0">
+              <a:srgbClr val="333333">
+                <a:alpha val="65000"/>
+              </a:srgbClr>
+            </a:outerShdw>
+          </a:effectLst>
           <a:extLst>
             <a:ext uri="{909E8E84-426E-40DD-AFC4-6F175D3DCCD1}">
               <a14:hiddenFill xmlns:a14="http://schemas.microsoft.com/office/drawing/2010/main">
@@ -5329,6 +5760,29 @@
           </a:extLst>
         </p:spPr>
       </p:pic>
+      <p:sp>
+        <p:nvSpPr>
+          <p:cNvPr id="5" name="Footer Placeholder 4"/>
+          <p:cNvSpPr>
+            <a:spLocks noGrp="1"/>
+          </p:cNvSpPr>
+          <p:nvPr>
+            <p:ph type="ftr" sz="quarter" idx="11"/>
+          </p:nvPr>
+        </p:nvSpPr>
+        <p:spPr/>
+        <p:txBody>
+          <a:bodyPr/>
+          <a:lstStyle/>
+          <a:p>
+            <a:r>
+              <a:rPr lang="en-US" smtClean="0"/>
+              <a:t>11/14</a:t>
+            </a:r>
+            <a:endParaRPr lang="en-US"/>
+          </a:p>
+        </p:txBody>
+      </p:sp>
     </p:spTree>
     <p:extLst>
       <p:ext uri="{BB962C8B-B14F-4D97-AF65-F5344CB8AC3E}">
@@ -5349,7 +5803,7 @@
 </p:sld>
 </file>
 
-<file path=ppt/slides/slide13.xml><?xml version="1.0" encoding="utf-8"?>
+<file path=ppt/slides/slide12.xml><?xml version="1.0" encoding="utf-8"?>
 <p:sld xmlns:a="http://schemas.openxmlformats.org/drawingml/2006/main" xmlns:r="http://schemas.openxmlformats.org/officeDocument/2006/relationships" xmlns:p="http://schemas.openxmlformats.org/presentationml/2006/main">
   <p:cSld>
     <p:spTree>
@@ -5650,27 +6104,32 @@
               <a:srgbClr val="C0C0C0"/>
             </a:contourClr>
           </a:sp3d>
-          <a:extLst>
-            <a:ext uri="{909E8E84-426E-40DD-AFC4-6F175D3DCCD1}">
-              <a14:hiddenFill xmlns:a14="http://schemas.microsoft.com/office/drawing/2010/main">
-                <a:solidFill>
-                  <a:schemeClr val="accent1"/>
-                </a:solidFill>
-              </a14:hiddenFill>
-            </a:ext>
-            <a:ext uri="{91240B29-F687-4F45-9708-019B960494DF}">
-              <a14:hiddenLine xmlns:a14="http://schemas.microsoft.com/office/drawing/2010/main" w="9525">
-                <a:solidFill>
-                  <a:schemeClr val="tx1"/>
-                </a:solidFill>
-                <a:miter lim="800000"/>
-                <a:headEnd/>
-                <a:tailEnd/>
-              </a14:hiddenLine>
-            </a:ext>
-          </a:extLst>
+          <a:extLst/>
         </p:spPr>
       </p:pic>
+      <p:sp>
+        <p:nvSpPr>
+          <p:cNvPr id="5" name="Footer Placeholder 4"/>
+          <p:cNvSpPr>
+            <a:spLocks noGrp="1"/>
+          </p:cNvSpPr>
+          <p:nvPr>
+            <p:ph type="ftr" sz="quarter" idx="11"/>
+          </p:nvPr>
+        </p:nvSpPr>
+        <p:spPr/>
+        <p:txBody>
+          <a:bodyPr/>
+          <a:lstStyle/>
+          <a:p>
+            <a:r>
+              <a:rPr lang="en-US" smtClean="0"/>
+              <a:t>12/14</a:t>
+            </a:r>
+            <a:endParaRPr lang="en-US"/>
+          </a:p>
+        </p:txBody>
+      </p:sp>
     </p:spTree>
     <p:extLst>
       <p:ext uri="{BB962C8B-B14F-4D97-AF65-F5344CB8AC3E}">
@@ -5759,7 +6218,7 @@
 </p:sld>
 </file>
 
-<file path=ppt/slides/slide14.xml><?xml version="1.0" encoding="utf-8"?>
+<file path=ppt/slides/slide13.xml><?xml version="1.0" encoding="utf-8"?>
 <p:sld xmlns:a="http://schemas.openxmlformats.org/drawingml/2006/main" xmlns:r="http://schemas.openxmlformats.org/officeDocument/2006/relationships" xmlns:p="http://schemas.openxmlformats.org/presentationml/2006/main">
   <p:cSld>
     <p:spTree>
@@ -5792,10 +6251,67 @@
           <a:lstStyle/>
           <a:p>
             <a:r>
-              <a:rPr lang="hu-HU" smtClean="0"/>
-              <a:t>Tancsics László BÚÚÚTA EMBER XDSXDXD</a:t>
+              <a:rPr lang="hu-HU" dirty="0" smtClean="0"/>
+              <a:t>Admin oldali funkciók:</a:t>
+            </a:r>
+          </a:p>
+          <a:p>
+            <a:pPr lvl="1">
+              <a:buFont typeface="Arial" pitchFamily="34" charset="0"/>
+              <a:buChar char="•"/>
+            </a:pPr>
+            <a:r>
+              <a:rPr lang="hu-HU" dirty="0"/>
+              <a:t>Időpontok </a:t>
+            </a:r>
+            <a:r>
+              <a:rPr lang="hu-HU" dirty="0" smtClean="0"/>
+              <a:t>vizualizációja</a:t>
+            </a:r>
+          </a:p>
+          <a:p>
+            <a:pPr lvl="1">
+              <a:buFont typeface="Arial" pitchFamily="34" charset="0"/>
+              <a:buChar char="•"/>
+            </a:pPr>
+            <a:r>
+              <a:rPr lang="hu-HU" dirty="0" smtClean="0"/>
+              <a:t>Árajánlát </a:t>
+            </a:r>
+            <a:r>
+              <a:rPr lang="hu-HU" dirty="0"/>
+              <a:t>kérések </a:t>
+            </a:r>
+            <a:r>
+              <a:rPr lang="hu-HU" dirty="0" smtClean="0"/>
+              <a:t>elfogadása/elutasítása/módosítása</a:t>
+            </a:r>
+          </a:p>
+          <a:p>
+            <a:pPr lvl="1">
+              <a:buFont typeface="Arial" pitchFamily="34" charset="0"/>
+              <a:buChar char="•"/>
+            </a:pPr>
+            <a:r>
+              <a:rPr lang="hu-HU" dirty="0" smtClean="0"/>
+              <a:t>Statikus részek (kapcsolat/céginfó) szerkesztése</a:t>
             </a:r>
             <a:endParaRPr lang="hu-HU" dirty="0"/>
+          </a:p>
+          <a:p>
+            <a:r>
+              <a:rPr lang="hu-HU" dirty="0" smtClean="0"/>
+              <a:t>Általános formázás</a:t>
+            </a:r>
+          </a:p>
+          <a:p>
+            <a:r>
+              <a:rPr lang="hu-HU" dirty="0" smtClean="0"/>
+              <a:t>Slider elkészítése</a:t>
+            </a:r>
+          </a:p>
+          <a:p>
+            <a:endParaRPr lang="hu-HU" dirty="0" smtClean="0"/>
           </a:p>
         </p:txBody>
       </p:sp>
@@ -5816,9 +6332,36 @@
           <a:p>
             <a:r>
               <a:rPr lang="hu-HU" dirty="0" smtClean="0"/>
-              <a:t>Összegzés</a:t>
+              <a:t>Jövőbeli </a:t>
+            </a:r>
+            <a:r>
+              <a:rPr lang="hu-HU" dirty="0" smtClean="0"/>
+              <a:t>tervek</a:t>
             </a:r>
             <a:endParaRPr lang="hu-HU" dirty="0"/>
+          </a:p>
+        </p:txBody>
+      </p:sp>
+      <p:sp>
+        <p:nvSpPr>
+          <p:cNvPr id="5" name="Footer Placeholder 4"/>
+          <p:cNvSpPr>
+            <a:spLocks noGrp="1"/>
+          </p:cNvSpPr>
+          <p:nvPr>
+            <p:ph type="ftr" sz="quarter" idx="11"/>
+          </p:nvPr>
+        </p:nvSpPr>
+        <p:spPr/>
+        <p:txBody>
+          <a:bodyPr/>
+          <a:lstStyle/>
+          <a:p>
+            <a:r>
+              <a:rPr lang="en-US" smtClean="0"/>
+              <a:t>13/14</a:t>
+            </a:r>
+            <a:endParaRPr lang="en-US"/>
           </a:p>
         </p:txBody>
       </p:sp>
@@ -5842,7 +6385,7 @@
 </p:sld>
 </file>
 
-<file path=ppt/slides/slide15.xml><?xml version="1.0" encoding="utf-8"?>
+<file path=ppt/slides/slide14.xml><?xml version="1.0" encoding="utf-8"?>
 <p:sld xmlns:a="http://schemas.openxmlformats.org/drawingml/2006/main" xmlns:r="http://schemas.openxmlformats.org/officeDocument/2006/relationships" xmlns:p="http://schemas.openxmlformats.org/presentationml/2006/main">
   <p:cSld>
     <p:spTree>
@@ -5904,6 +6447,29 @@
               <a:t>Köszönjük a figyelmet!</a:t>
             </a:r>
             <a:endParaRPr lang="hu-HU" dirty="0"/>
+          </a:p>
+        </p:txBody>
+      </p:sp>
+      <p:sp>
+        <p:nvSpPr>
+          <p:cNvPr id="5" name="Footer Placeholder 4"/>
+          <p:cNvSpPr>
+            <a:spLocks noGrp="1"/>
+          </p:cNvSpPr>
+          <p:nvPr>
+            <p:ph type="ftr" sz="quarter" idx="11"/>
+          </p:nvPr>
+        </p:nvSpPr>
+        <p:spPr/>
+        <p:txBody>
+          <a:bodyPr/>
+          <a:lstStyle/>
+          <a:p>
+            <a:r>
+              <a:rPr lang="en-US" smtClean="0"/>
+              <a:t>14/14</a:t>
+            </a:r>
+            <a:endParaRPr lang="en-US"/>
           </a:p>
         </p:txBody>
       </p:sp>
@@ -5966,7 +6532,7 @@
             </a:pPr>
             <a:r>
               <a:rPr lang="hu-HU" dirty="0" smtClean="0"/>
-              <a:t>Célkitűzés – alkalmazásunk célja</a:t>
+              <a:t>Célkitűzés</a:t>
             </a:r>
           </a:p>
           <a:p>
@@ -5977,7 +6543,7 @@
             </a:pPr>
             <a:r>
               <a:rPr lang="hu-HU" dirty="0" smtClean="0"/>
-              <a:t>Funkciók – use-case ábra</a:t>
+              <a:t>Funkciók</a:t>
             </a:r>
           </a:p>
           <a:p>
@@ -5988,7 +6554,7 @@
             </a:pPr>
             <a:r>
               <a:rPr lang="hu-HU" dirty="0" smtClean="0"/>
-              <a:t>Használt technológiák – előnyök/hátrányok</a:t>
+              <a:t>Használt technológiák</a:t>
             </a:r>
           </a:p>
           <a:p>
@@ -5999,7 +6565,7 @@
             </a:pPr>
             <a:r>
               <a:rPr lang="hu-HU" dirty="0" smtClean="0"/>
-              <a:t>Adatmodell – a felhasznált adatbázis</a:t>
+              <a:t>Adatmodell</a:t>
             </a:r>
           </a:p>
           <a:p>
@@ -6010,7 +6576,7 @@
             </a:pPr>
             <a:r>
               <a:rPr lang="hu-HU" dirty="0" smtClean="0"/>
-              <a:t>Képernyőképek – az alkalmazás futás közben</a:t>
+              <a:t>Képernyőképek</a:t>
             </a:r>
           </a:p>
           <a:p>
@@ -6021,7 +6587,7 @@
             </a:pPr>
             <a:r>
               <a:rPr lang="hu-HU" dirty="0" smtClean="0"/>
-              <a:t>Összegzés</a:t>
+              <a:t>Jövőbeli tervek</a:t>
             </a:r>
             <a:endParaRPr lang="hu-HU" dirty="0"/>
           </a:p>
@@ -6047,6 +6613,29 @@
               <a:t>Tartalom</a:t>
             </a:r>
             <a:endParaRPr lang="hu-HU" dirty="0"/>
+          </a:p>
+        </p:txBody>
+      </p:sp>
+      <p:sp>
+        <p:nvSpPr>
+          <p:cNvPr id="5" name="Footer Placeholder 4"/>
+          <p:cNvSpPr>
+            <a:spLocks noGrp="1"/>
+          </p:cNvSpPr>
+          <p:nvPr>
+            <p:ph type="ftr" sz="quarter" idx="11"/>
+          </p:nvPr>
+        </p:nvSpPr>
+        <p:spPr/>
+        <p:txBody>
+          <a:bodyPr/>
+          <a:lstStyle/>
+          <a:p>
+            <a:r>
+              <a:rPr lang="en-US" smtClean="0"/>
+              <a:t>2/14</a:t>
+            </a:r>
+            <a:endParaRPr lang="en-US"/>
           </a:p>
         </p:txBody>
       </p:sp>
@@ -6099,7 +6688,9 @@
         </p:nvSpPr>
         <p:spPr/>
         <p:txBody>
-          <a:bodyPr/>
+          <a:bodyPr>
+            <a:normAutofit lnSpcReduction="10000"/>
+          </a:bodyPr>
           <a:lstStyle/>
           <a:p>
             <a:r>
@@ -6108,7 +6699,37 @@
             </a:r>
             <a:r>
               <a:rPr lang="hu-HU" dirty="0" smtClean="0"/>
-              <a:t>platformra – platformfüggetlenség, PWA</a:t>
+              <a:t>platformra</a:t>
+            </a:r>
+          </a:p>
+          <a:p>
+            <a:pPr lvl="1">
+              <a:buFont typeface="Arial" pitchFamily="34" charset="0"/>
+              <a:buChar char="•"/>
+            </a:pPr>
+            <a:r>
+              <a:rPr lang="hu-HU" dirty="0" smtClean="0"/>
+              <a:t>PWA</a:t>
+            </a:r>
+          </a:p>
+          <a:p>
+            <a:pPr lvl="1">
+              <a:buFont typeface="Arial" pitchFamily="34" charset="0"/>
+              <a:buChar char="•"/>
+            </a:pPr>
+            <a:r>
+              <a:rPr lang="hu-HU" dirty="0" smtClean="0"/>
+              <a:t>Ionic</a:t>
+            </a:r>
+          </a:p>
+          <a:p>
+            <a:pPr lvl="1">
+              <a:buFont typeface="Arial" pitchFamily="34" charset="0"/>
+              <a:buChar char="•"/>
+            </a:pPr>
+            <a:r>
+              <a:rPr lang="hu-HU" dirty="0" smtClean="0"/>
+              <a:t>React</a:t>
             </a:r>
           </a:p>
           <a:p>
@@ -6118,7 +6739,10 @@
             </a:r>
           </a:p>
           <a:p>
-            <a:pPr lvl="1"/>
+            <a:pPr lvl="1">
+              <a:buFont typeface="Arial" pitchFamily="34" charset="0"/>
+              <a:buChar char="•"/>
+            </a:pPr>
             <a:r>
               <a:rPr lang="hu-HU" dirty="0" smtClean="0"/>
               <a:t>felhasználói </a:t>
@@ -6129,19 +6753,20 @@
             </a:r>
           </a:p>
           <a:p>
-            <a:pPr lvl="1"/>
-            <a:r>
-              <a:rPr lang="hu-HU" dirty="0"/>
-              <a:t>Időpontfoglalás – vizuális </a:t>
-            </a:r>
+            <a:pPr lvl="1">
+              <a:buFont typeface="Arial" pitchFamily="34" charset="0"/>
+              <a:buChar char="•"/>
+            </a:pPr>
             <a:r>
               <a:rPr lang="hu-HU" dirty="0" smtClean="0"/>
-              <a:t>megjelenítés</a:t>
-            </a:r>
-            <a:endParaRPr lang="hu-HU" dirty="0"/>
-          </a:p>
-          <a:p>
-            <a:pPr lvl="1"/>
+              <a:t>Időpontfoglalás</a:t>
+            </a:r>
+          </a:p>
+          <a:p>
+            <a:pPr lvl="1">
+              <a:buFont typeface="Arial" pitchFamily="34" charset="0"/>
+              <a:buChar char="•"/>
+            </a:pPr>
             <a:r>
               <a:rPr lang="hu-HU" dirty="0" smtClean="0"/>
               <a:t>árajánlatok </a:t>
@@ -6152,10 +6777,21 @@
             </a:r>
           </a:p>
           <a:p>
-            <a:pPr lvl="1"/>
+            <a:pPr lvl="1">
+              <a:buFont typeface="Arial" pitchFamily="34" charset="0"/>
+              <a:buChar char="•"/>
+            </a:pPr>
             <a:r>
               <a:rPr lang="hu-HU" dirty="0" smtClean="0"/>
-              <a:t>további statikus funkciók – kapcsolat, céginfó</a:t>
+              <a:t>további statikus funkciók </a:t>
+            </a:r>
+            <a:r>
+              <a:rPr lang="hu-HU" dirty="0"/>
+              <a:t>(</a:t>
+            </a:r>
+            <a:r>
+              <a:rPr lang="hu-HU" dirty="0" smtClean="0"/>
+              <a:t>kapcsolat, céginfó)</a:t>
             </a:r>
             <a:br>
               <a:rPr lang="hu-HU" dirty="0" smtClean="0"/>
@@ -6184,6 +6820,29 @@
               <a:t>Célkitűzés</a:t>
             </a:r>
             <a:endParaRPr lang="hu-HU" dirty="0"/>
+          </a:p>
+        </p:txBody>
+      </p:sp>
+      <p:sp>
+        <p:nvSpPr>
+          <p:cNvPr id="5" name="Footer Placeholder 4"/>
+          <p:cNvSpPr>
+            <a:spLocks noGrp="1"/>
+          </p:cNvSpPr>
+          <p:nvPr>
+            <p:ph type="ftr" sz="quarter" idx="11"/>
+          </p:nvPr>
+        </p:nvSpPr>
+        <p:spPr/>
+        <p:txBody>
+          <a:bodyPr/>
+          <a:lstStyle/>
+          <a:p>
+            <a:r>
+              <a:rPr lang="en-US" smtClean="0"/>
+              <a:t>3/14</a:t>
+            </a:r>
+            <a:endParaRPr lang="en-US"/>
           </a:p>
         </p:txBody>
       </p:sp>
@@ -6197,6 +6856,13 @@
   <p:clrMapOvr>
     <a:masterClrMapping/>
   </p:clrMapOvr>
+  <p:timing>
+    <p:tnLst>
+      <p:par>
+        <p:cTn id="1" dur="indefinite" restart="never" nodeType="tmRoot"/>
+      </p:par>
+    </p:tnLst>
+  </p:timing>
 </p:sld>
 </file>
 
@@ -6300,6 +6966,29 @@
           </a:extLst>
         </p:spPr>
       </p:pic>
+      <p:sp>
+        <p:nvSpPr>
+          <p:cNvPr id="5" name="Footer Placeholder 4"/>
+          <p:cNvSpPr>
+            <a:spLocks noGrp="1"/>
+          </p:cNvSpPr>
+          <p:nvPr>
+            <p:ph type="ftr" sz="quarter" idx="11"/>
+          </p:nvPr>
+        </p:nvSpPr>
+        <p:spPr/>
+        <p:txBody>
+          <a:bodyPr/>
+          <a:lstStyle/>
+          <a:p>
+            <a:r>
+              <a:rPr lang="en-US" smtClean="0"/>
+              <a:t>4/14</a:t>
+            </a:r>
+            <a:endParaRPr lang="en-US"/>
+          </a:p>
+        </p:txBody>
+      </p:sp>
     </p:spTree>
     <p:extLst>
       <p:ext uri="{BB962C8B-B14F-4D97-AF65-F5344CB8AC3E}">
@@ -6349,32 +7038,159 @@
         </p:nvSpPr>
         <p:spPr/>
         <p:txBody>
+          <a:bodyPr>
+            <a:normAutofit fontScale="92500" lnSpcReduction="10000"/>
+          </a:bodyPr>
+          <a:lstStyle/>
+          <a:p>
+            <a:r>
+              <a:rPr lang="hu-HU" dirty="0" smtClean="0"/>
+              <a:t>Firebase </a:t>
+            </a:r>
+            <a:endParaRPr lang="hu-HU" dirty="0"/>
+          </a:p>
+          <a:p>
+            <a:pPr lvl="1">
+              <a:buFont typeface="Arial" pitchFamily="34" charset="0"/>
+              <a:buChar char="•"/>
+            </a:pPr>
+            <a:r>
+              <a:rPr lang="hu-HU" dirty="0" smtClean="0"/>
+              <a:t>Google</a:t>
+            </a:r>
+          </a:p>
+          <a:p>
+            <a:pPr lvl="1">
+              <a:buFont typeface="Arial" pitchFamily="34" charset="0"/>
+              <a:buChar char="•"/>
+            </a:pPr>
+            <a:r>
+              <a:rPr lang="hu-HU" dirty="0" smtClean="0"/>
+              <a:t>valósidejű NoSQL adatbázis</a:t>
+            </a:r>
+          </a:p>
+          <a:p>
+            <a:pPr lvl="1">
+              <a:buFont typeface="Arial" pitchFamily="34" charset="0"/>
+              <a:buChar char="•"/>
+            </a:pPr>
+            <a:r>
+              <a:rPr lang="hu-HU" dirty="0" smtClean="0"/>
+              <a:t>felhő </a:t>
+            </a:r>
+            <a:r>
+              <a:rPr lang="hu-HU" dirty="0"/>
+              <a:t>alapú </a:t>
+            </a:r>
+            <a:r>
+              <a:rPr lang="hu-HU" dirty="0" smtClean="0"/>
+              <a:t>adattárolás</a:t>
+            </a:r>
+          </a:p>
+          <a:p>
+            <a:pPr lvl="1">
+              <a:buFont typeface="Arial" pitchFamily="34" charset="0"/>
+              <a:buChar char="•"/>
+            </a:pPr>
+            <a:r>
+              <a:rPr lang="hu-HU" dirty="0" smtClean="0"/>
+              <a:t>JSON alapú</a:t>
+            </a:r>
+          </a:p>
+          <a:p>
+            <a:pPr lvl="1">
+              <a:buFont typeface="Arial" pitchFamily="34" charset="0"/>
+              <a:buChar char="•"/>
+            </a:pPr>
+            <a:r>
+              <a:rPr lang="hu-HU" dirty="0" smtClean="0"/>
+              <a:t>autentikáció</a:t>
+            </a:r>
+          </a:p>
+          <a:p>
+            <a:r>
+              <a:rPr lang="hu-HU" dirty="0" smtClean="0"/>
+              <a:t>Ionic Framework </a:t>
+            </a:r>
+            <a:endParaRPr lang="hu-HU" dirty="0"/>
+          </a:p>
+          <a:p>
+            <a:pPr lvl="1">
+              <a:buFont typeface="Arial" pitchFamily="34" charset="0"/>
+              <a:buChar char="•"/>
+            </a:pPr>
+            <a:r>
+              <a:rPr lang="hu-HU" dirty="0" smtClean="0"/>
+              <a:t>PWA (Service Worker, Web Manifest), Capacitor</a:t>
+            </a:r>
+          </a:p>
+          <a:p>
+            <a:r>
+              <a:rPr lang="hu-HU" dirty="0" smtClean="0"/>
+              <a:t>React </a:t>
+            </a:r>
+            <a:endParaRPr lang="hu-HU" dirty="0"/>
+          </a:p>
+          <a:p>
+            <a:pPr lvl="1">
+              <a:buFont typeface="Arial" pitchFamily="34" charset="0"/>
+              <a:buChar char="•"/>
+            </a:pPr>
+            <a:r>
+              <a:rPr lang="hu-HU" dirty="0" smtClean="0"/>
+              <a:t>JavaScript library </a:t>
+            </a:r>
+          </a:p>
+          <a:p>
+            <a:pPr lvl="1">
+              <a:buFont typeface="Arial" pitchFamily="34" charset="0"/>
+              <a:buChar char="•"/>
+            </a:pPr>
+            <a:r>
+              <a:rPr lang="hu-HU" dirty="0" smtClean="0"/>
+              <a:t>felhasználói interface-ek</a:t>
+            </a:r>
+          </a:p>
+          <a:p>
+            <a:pPr lvl="1">
+              <a:buFont typeface="Arial" pitchFamily="34" charset="0"/>
+              <a:buChar char="•"/>
+            </a:pPr>
+            <a:r>
+              <a:rPr lang="hu-HU" dirty="0" smtClean="0"/>
+              <a:t>Komponensek</a:t>
+            </a:r>
+          </a:p>
+          <a:p>
+            <a:pPr lvl="1">
+              <a:buFont typeface="Arial" pitchFamily="34" charset="0"/>
+              <a:buChar char="•"/>
+            </a:pPr>
+            <a:r>
+              <a:rPr lang="hu-HU" dirty="0" smtClean="0"/>
+              <a:t>Renderelés</a:t>
+            </a:r>
+          </a:p>
+        </p:txBody>
+      </p:sp>
+      <p:sp>
+        <p:nvSpPr>
+          <p:cNvPr id="3" name="Title 2"/>
+          <p:cNvSpPr>
+            <a:spLocks noGrp="1"/>
+          </p:cNvSpPr>
+          <p:nvPr>
+            <p:ph type="title"/>
+          </p:nvPr>
+        </p:nvSpPr>
+        <p:spPr/>
+        <p:txBody>
           <a:bodyPr/>
           <a:lstStyle/>
           <a:p>
             <a:r>
               <a:rPr lang="hu-HU" dirty="0" smtClean="0"/>
-              <a:t>Firebase – Google, valósidejű NoSQL adatbázis, </a:t>
-            </a:r>
-            <a:r>
-              <a:rPr lang="hu-HU" dirty="0"/>
-              <a:t>felhő alapú </a:t>
-            </a:r>
-            <a:r>
-              <a:rPr lang="hu-HU" dirty="0" smtClean="0"/>
-              <a:t>tárolás, JSON alapú, autentikáció</a:t>
-            </a:r>
-          </a:p>
-          <a:p>
-            <a:r>
-              <a:rPr lang="hu-HU" dirty="0" smtClean="0"/>
-              <a:t>Ionic Framework – keretrendszer, platformfüggetlenség, PWA (Service Worker, Web Manifest), Capacitor</a:t>
-            </a:r>
-          </a:p>
-          <a:p>
-            <a:r>
-              <a:rPr lang="hu-HU" dirty="0" smtClean="0"/>
-              <a:t>React – JavaScript library felhasználói interface-ek készítésére, komponensek, renderelés, alternatívák: Angular, Vue</a:t>
+              <a:t>Használt technológiák</a:t>
             </a:r>
             <a:endParaRPr lang="hu-HU" dirty="0"/>
           </a:p>
@@ -6382,12 +7198,12 @@
       </p:sp>
       <p:sp>
         <p:nvSpPr>
-          <p:cNvPr id="3" name="Title 2"/>
-          <p:cNvSpPr>
-            <a:spLocks noGrp="1"/>
-          </p:cNvSpPr>
-          <p:nvPr>
-            <p:ph type="title"/>
+          <p:cNvPr id="5" name="Footer Placeholder 4"/>
+          <p:cNvSpPr>
+            <a:spLocks noGrp="1"/>
+          </p:cNvSpPr>
+          <p:nvPr>
+            <p:ph type="ftr" sz="quarter" idx="11"/>
           </p:nvPr>
         </p:nvSpPr>
         <p:spPr/>
@@ -6396,10 +7212,10 @@
           <a:lstStyle/>
           <a:p>
             <a:r>
-              <a:rPr lang="hu-HU" dirty="0" smtClean="0"/>
-              <a:t>Használt technológiák</a:t>
-            </a:r>
-            <a:endParaRPr lang="hu-HU" dirty="0"/>
+              <a:rPr lang="en-US" smtClean="0"/>
+              <a:t>5/14</a:t>
+            </a:r>
+            <a:endParaRPr lang="en-US"/>
           </a:p>
         </p:txBody>
       </p:sp>
@@ -6413,6 +7229,13 @@
   <p:clrMapOvr>
     <a:masterClrMapping/>
   </p:clrMapOvr>
+  <p:timing>
+    <p:tnLst>
+      <p:par>
+        <p:cTn id="1" dur="indefinite" restart="never" nodeType="tmRoot"/>
+      </p:par>
+    </p:tnLst>
+  </p:timing>
 </p:sld>
 </file>
 
@@ -6551,6 +7374,29 @@
           <a:extLst/>
         </p:spPr>
       </p:pic>
+      <p:sp>
+        <p:nvSpPr>
+          <p:cNvPr id="5" name="Footer Placeholder 4"/>
+          <p:cNvSpPr>
+            <a:spLocks noGrp="1"/>
+          </p:cNvSpPr>
+          <p:nvPr>
+            <p:ph type="ftr" sz="quarter" idx="11"/>
+          </p:nvPr>
+        </p:nvSpPr>
+        <p:spPr/>
+        <p:txBody>
+          <a:bodyPr/>
+          <a:lstStyle/>
+          <a:p>
+            <a:r>
+              <a:rPr lang="en-US" smtClean="0"/>
+              <a:t>6/14</a:t>
+            </a:r>
+            <a:endParaRPr lang="en-US"/>
+          </a:p>
+        </p:txBody>
+      </p:sp>
     </p:spTree>
     <p:extLst>
       <p:ext uri="{BB962C8B-B14F-4D97-AF65-F5344CB8AC3E}">
@@ -6631,9 +7477,32 @@
           </a:p>
         </p:txBody>
       </p:sp>
+      <p:sp>
+        <p:nvSpPr>
+          <p:cNvPr id="5" name="Footer Placeholder 4"/>
+          <p:cNvSpPr>
+            <a:spLocks noGrp="1"/>
+          </p:cNvSpPr>
+          <p:nvPr>
+            <p:ph type="ftr" sz="quarter" idx="11"/>
+          </p:nvPr>
+        </p:nvSpPr>
+        <p:spPr/>
+        <p:txBody>
+          <a:bodyPr/>
+          <a:lstStyle/>
+          <a:p>
+            <a:r>
+              <a:rPr lang="en-US" smtClean="0"/>
+              <a:t>7/14</a:t>
+            </a:r>
+            <a:endParaRPr lang="en-US"/>
+          </a:p>
+        </p:txBody>
+      </p:sp>
       <p:pic>
         <p:nvPicPr>
-          <p:cNvPr id="3074" name="Picture 2"/>
+          <p:cNvPr id="1026" name="Picture 2"/>
           <p:cNvPicPr>
             <a:picLocks noChangeAspect="1" noChangeArrowheads="1"/>
           </p:cNvPicPr>
@@ -6654,8 +7523,8 @@
         </p:blipFill>
         <p:spPr bwMode="auto">
           <a:xfrm>
-            <a:off x="166688" y="1866900"/>
-            <a:ext cx="8810625" cy="3124200"/>
+            <a:off x="1338263" y="1766888"/>
+            <a:ext cx="6467475" cy="3324225"/>
           </a:xfrm>
           <a:prstGeom prst="rect">
             <a:avLst/>
@@ -6689,7 +7558,25 @@
               <a:srgbClr val="C0C0C0"/>
             </a:contourClr>
           </a:sp3d>
-          <a:extLst/>
+          <a:extLst>
+            <a:ext uri="{909E8E84-426E-40DD-AFC4-6F175D3DCCD1}">
+              <a14:hiddenFill xmlns:a14="http://schemas.microsoft.com/office/drawing/2010/main">
+                <a:solidFill>
+                  <a:schemeClr val="accent1"/>
+                </a:solidFill>
+              </a14:hiddenFill>
+            </a:ext>
+            <a:ext uri="{91240B29-F687-4F45-9708-019B960494DF}">
+              <a14:hiddenLine xmlns:a14="http://schemas.microsoft.com/office/drawing/2010/main" w="9525">
+                <a:solidFill>
+                  <a:schemeClr val="tx1"/>
+                </a:solidFill>
+                <a:miter lim="800000"/>
+                <a:headEnd/>
+                <a:tailEnd/>
+              </a14:hiddenLine>
+            </a:ext>
+          </a:extLst>
         </p:spPr>
       </p:pic>
     </p:spTree>
@@ -6832,27 +7719,32 @@
               <a:srgbClr val="C0C0C0"/>
             </a:contourClr>
           </a:sp3d>
-          <a:extLst>
-            <a:ext uri="{909E8E84-426E-40DD-AFC4-6F175D3DCCD1}">
-              <a14:hiddenFill xmlns:a14="http://schemas.microsoft.com/office/drawing/2010/main">
-                <a:solidFill>
-                  <a:schemeClr val="accent1"/>
-                </a:solidFill>
-              </a14:hiddenFill>
-            </a:ext>
-            <a:ext uri="{91240B29-F687-4F45-9708-019B960494DF}">
-              <a14:hiddenLine xmlns:a14="http://schemas.microsoft.com/office/drawing/2010/main" w="9525">
-                <a:solidFill>
-                  <a:schemeClr val="tx1"/>
-                </a:solidFill>
-                <a:miter lim="800000"/>
-                <a:headEnd/>
-                <a:tailEnd/>
-              </a14:hiddenLine>
-            </a:ext>
-          </a:extLst>
+          <a:extLst/>
         </p:spPr>
       </p:pic>
+      <p:sp>
+        <p:nvSpPr>
+          <p:cNvPr id="4" name="Footer Placeholder 3"/>
+          <p:cNvSpPr>
+            <a:spLocks noGrp="1"/>
+          </p:cNvSpPr>
+          <p:nvPr>
+            <p:ph type="ftr" sz="quarter" idx="11"/>
+          </p:nvPr>
+        </p:nvSpPr>
+        <p:spPr/>
+        <p:txBody>
+          <a:bodyPr/>
+          <a:lstStyle/>
+          <a:p>
+            <a:r>
+              <a:rPr lang="en-US" smtClean="0"/>
+              <a:t>8/14</a:t>
+            </a:r>
+            <a:endParaRPr lang="en-US"/>
+          </a:p>
+        </p:txBody>
+      </p:sp>
     </p:spTree>
     <p:extLst>
       <p:ext uri="{BB962C8B-B14F-4D97-AF65-F5344CB8AC3E}">
@@ -6994,6 +7886,29 @@
           <a:extLst/>
         </p:spPr>
       </p:pic>
+      <p:sp>
+        <p:nvSpPr>
+          <p:cNvPr id="5" name="Footer Placeholder 4"/>
+          <p:cNvSpPr>
+            <a:spLocks noGrp="1"/>
+          </p:cNvSpPr>
+          <p:nvPr>
+            <p:ph type="ftr" sz="quarter" idx="11"/>
+          </p:nvPr>
+        </p:nvSpPr>
+        <p:spPr/>
+        <p:txBody>
+          <a:bodyPr/>
+          <a:lstStyle/>
+          <a:p>
+            <a:r>
+              <a:rPr lang="en-US" smtClean="0"/>
+              <a:t>9/14</a:t>
+            </a:r>
+            <a:endParaRPr lang="en-US"/>
+          </a:p>
+        </p:txBody>
+      </p:sp>
     </p:spTree>
     <p:extLst>
       <p:ext uri="{BB962C8B-B14F-4D97-AF65-F5344CB8AC3E}">
@@ -7299,4 +8214,289 @@
   <a:objectDefaults/>
   <a:extraClrSchemeLst/>
 </a:theme>
+</file>
+
+<file path=ppt/theme/theme2.xml><?xml version="1.0" encoding="utf-8"?>
+<a:theme xmlns:a="http://schemas.openxmlformats.org/drawingml/2006/main" name="Office Theme">
+  <a:themeElements>
+    <a:clrScheme name="Office">
+      <a:dk1>
+        <a:sysClr val="windowText" lastClr="000000"/>
+      </a:dk1>
+      <a:lt1>
+        <a:sysClr val="window" lastClr="FFFFFF"/>
+      </a:lt1>
+      <a:dk2>
+        <a:srgbClr val="1F497D"/>
+      </a:dk2>
+      <a:lt2>
+        <a:srgbClr val="EEECE1"/>
+      </a:lt2>
+      <a:accent1>
+        <a:srgbClr val="4F81BD"/>
+      </a:accent1>
+      <a:accent2>
+        <a:srgbClr val="C0504D"/>
+      </a:accent2>
+      <a:accent3>
+        <a:srgbClr val="9BBB59"/>
+      </a:accent3>
+      <a:accent4>
+        <a:srgbClr val="8064A2"/>
+      </a:accent4>
+      <a:accent5>
+        <a:srgbClr val="4BACC6"/>
+      </a:accent5>
+      <a:accent6>
+        <a:srgbClr val="F79646"/>
+      </a:accent6>
+      <a:hlink>
+        <a:srgbClr val="0000FF"/>
+      </a:hlink>
+      <a:folHlink>
+        <a:srgbClr val="800080"/>
+      </a:folHlink>
+    </a:clrScheme>
+    <a:fontScheme name="Office">
+      <a:majorFont>
+        <a:latin typeface="Calibri"/>
+        <a:ea typeface=""/>
+        <a:cs typeface=""/>
+        <a:font script="Jpan" typeface="ＭＳ Ｐゴシック"/>
+        <a:font script="Hang" typeface="맑은 고딕"/>
+        <a:font script="Hans" typeface="宋体"/>
+        <a:font script="Hant" typeface="新細明體"/>
+        <a:font script="Arab" typeface="Times New Roman"/>
+        <a:font script="Hebr" typeface="Times New Roman"/>
+        <a:font script="Thai" typeface="Angsana New"/>
+        <a:font script="Ethi" typeface="Nyala"/>
+        <a:font script="Beng" typeface="Vrinda"/>
+        <a:font script="Gujr" typeface="Shruti"/>
+        <a:font script="Khmr" typeface="MoolBoran"/>
+        <a:font script="Knda" typeface="Tunga"/>
+        <a:font script="Guru" typeface="Raavi"/>
+        <a:font script="Cans" typeface="Euphemia"/>
+        <a:font script="Cher" typeface="Plantagenet Cherokee"/>
+        <a:font script="Yiii" typeface="Microsoft Yi Baiti"/>
+        <a:font script="Tibt" typeface="Microsoft Himalaya"/>
+        <a:font script="Thaa" typeface="MV Boli"/>
+        <a:font script="Deva" typeface="Mangal"/>
+        <a:font script="Telu" typeface="Gautami"/>
+        <a:font script="Taml" typeface="Latha"/>
+        <a:font script="Syrc" typeface="Estrangelo Edessa"/>
+        <a:font script="Orya" typeface="Kalinga"/>
+        <a:font script="Mlym" typeface="Kartika"/>
+        <a:font script="Laoo" typeface="DokChampa"/>
+        <a:font script="Sinh" typeface="Iskoola Pota"/>
+        <a:font script="Mong" typeface="Mongolian Baiti"/>
+        <a:font script="Viet" typeface="Times New Roman"/>
+        <a:font script="Uigh" typeface="Microsoft Uighur"/>
+        <a:font script="Geor" typeface="Sylfaen"/>
+      </a:majorFont>
+      <a:minorFont>
+        <a:latin typeface="Calibri"/>
+        <a:ea typeface=""/>
+        <a:cs typeface=""/>
+        <a:font script="Jpan" typeface="ＭＳ Ｐゴシック"/>
+        <a:font script="Hang" typeface="맑은 고딕"/>
+        <a:font script="Hans" typeface="宋体"/>
+        <a:font script="Hant" typeface="新細明體"/>
+        <a:font script="Arab" typeface="Arial"/>
+        <a:font script="Hebr" typeface="Arial"/>
+        <a:font script="Thai" typeface="Cordia New"/>
+        <a:font script="Ethi" typeface="Nyala"/>
+        <a:font script="Beng" typeface="Vrinda"/>
+        <a:font script="Gujr" typeface="Shruti"/>
+        <a:font script="Khmr" typeface="DaunPenh"/>
+        <a:font script="Knda" typeface="Tunga"/>
+        <a:font script="Guru" typeface="Raavi"/>
+        <a:font script="Cans" typeface="Euphemia"/>
+        <a:font script="Cher" typeface="Plantagenet Cherokee"/>
+        <a:font script="Yiii" typeface="Microsoft Yi Baiti"/>
+        <a:font script="Tibt" typeface="Microsoft Himalaya"/>
+        <a:font script="Thaa" typeface="MV Boli"/>
+        <a:font script="Deva" typeface="Mangal"/>
+        <a:font script="Telu" typeface="Gautami"/>
+        <a:font script="Taml" typeface="Latha"/>
+        <a:font script="Syrc" typeface="Estrangelo Edessa"/>
+        <a:font script="Orya" typeface="Kalinga"/>
+        <a:font script="Mlym" typeface="Kartika"/>
+        <a:font script="Laoo" typeface="DokChampa"/>
+        <a:font script="Sinh" typeface="Iskoola Pota"/>
+        <a:font script="Mong" typeface="Mongolian Baiti"/>
+        <a:font script="Viet" typeface="Arial"/>
+        <a:font script="Uigh" typeface="Microsoft Uighur"/>
+        <a:font script="Geor" typeface="Sylfaen"/>
+      </a:minorFont>
+    </a:fontScheme>
+    <a:fmtScheme name="Office">
+      <a:fillStyleLst>
+        <a:solidFill>
+          <a:schemeClr val="phClr"/>
+        </a:solidFill>
+        <a:gradFill rotWithShape="1">
+          <a:gsLst>
+            <a:gs pos="0">
+              <a:schemeClr val="phClr">
+                <a:tint val="50000"/>
+                <a:satMod val="300000"/>
+              </a:schemeClr>
+            </a:gs>
+            <a:gs pos="35000">
+              <a:schemeClr val="phClr">
+                <a:tint val="37000"/>
+                <a:satMod val="300000"/>
+              </a:schemeClr>
+            </a:gs>
+            <a:gs pos="100000">
+              <a:schemeClr val="phClr">
+                <a:tint val="15000"/>
+                <a:satMod val="350000"/>
+              </a:schemeClr>
+            </a:gs>
+          </a:gsLst>
+          <a:lin ang="16200000" scaled="1"/>
+        </a:gradFill>
+        <a:gradFill rotWithShape="1">
+          <a:gsLst>
+            <a:gs pos="0">
+              <a:schemeClr val="phClr">
+                <a:shade val="51000"/>
+                <a:satMod val="130000"/>
+              </a:schemeClr>
+            </a:gs>
+            <a:gs pos="80000">
+              <a:schemeClr val="phClr">
+                <a:shade val="93000"/>
+                <a:satMod val="130000"/>
+              </a:schemeClr>
+            </a:gs>
+            <a:gs pos="100000">
+              <a:schemeClr val="phClr">
+                <a:shade val="94000"/>
+                <a:satMod val="135000"/>
+              </a:schemeClr>
+            </a:gs>
+          </a:gsLst>
+          <a:lin ang="16200000" scaled="0"/>
+        </a:gradFill>
+      </a:fillStyleLst>
+      <a:lnStyleLst>
+        <a:ln w="9525" cap="flat" cmpd="sng" algn="ctr">
+          <a:solidFill>
+            <a:schemeClr val="phClr">
+              <a:shade val="95000"/>
+              <a:satMod val="105000"/>
+            </a:schemeClr>
+          </a:solidFill>
+          <a:prstDash val="solid"/>
+        </a:ln>
+        <a:ln w="25400" cap="flat" cmpd="sng" algn="ctr">
+          <a:solidFill>
+            <a:schemeClr val="phClr"/>
+          </a:solidFill>
+          <a:prstDash val="solid"/>
+        </a:ln>
+        <a:ln w="38100" cap="flat" cmpd="sng" algn="ctr">
+          <a:solidFill>
+            <a:schemeClr val="phClr"/>
+          </a:solidFill>
+          <a:prstDash val="solid"/>
+        </a:ln>
+      </a:lnStyleLst>
+      <a:effectStyleLst>
+        <a:effectStyle>
+          <a:effectLst>
+            <a:outerShdw blurRad="40000" dist="20000" dir="5400000" rotWithShape="0">
+              <a:srgbClr val="000000">
+                <a:alpha val="38000"/>
+              </a:srgbClr>
+            </a:outerShdw>
+          </a:effectLst>
+        </a:effectStyle>
+        <a:effectStyle>
+          <a:effectLst>
+            <a:outerShdw blurRad="40000" dist="23000" dir="5400000" rotWithShape="0">
+              <a:srgbClr val="000000">
+                <a:alpha val="35000"/>
+              </a:srgbClr>
+            </a:outerShdw>
+          </a:effectLst>
+        </a:effectStyle>
+        <a:effectStyle>
+          <a:effectLst>
+            <a:outerShdw blurRad="40000" dist="23000" dir="5400000" rotWithShape="0">
+              <a:srgbClr val="000000">
+                <a:alpha val="35000"/>
+              </a:srgbClr>
+            </a:outerShdw>
+          </a:effectLst>
+          <a:scene3d>
+            <a:camera prst="orthographicFront">
+              <a:rot lat="0" lon="0" rev="0"/>
+            </a:camera>
+            <a:lightRig rig="threePt" dir="t">
+              <a:rot lat="0" lon="0" rev="1200000"/>
+            </a:lightRig>
+          </a:scene3d>
+          <a:sp3d>
+            <a:bevelT w="63500" h="25400"/>
+          </a:sp3d>
+        </a:effectStyle>
+      </a:effectStyleLst>
+      <a:bgFillStyleLst>
+        <a:solidFill>
+          <a:schemeClr val="phClr"/>
+        </a:solidFill>
+        <a:gradFill rotWithShape="1">
+          <a:gsLst>
+            <a:gs pos="0">
+              <a:schemeClr val="phClr">
+                <a:tint val="40000"/>
+                <a:satMod val="350000"/>
+              </a:schemeClr>
+            </a:gs>
+            <a:gs pos="40000">
+              <a:schemeClr val="phClr">
+                <a:tint val="45000"/>
+                <a:shade val="99000"/>
+                <a:satMod val="350000"/>
+              </a:schemeClr>
+            </a:gs>
+            <a:gs pos="100000">
+              <a:schemeClr val="phClr">
+                <a:shade val="20000"/>
+                <a:satMod val="255000"/>
+              </a:schemeClr>
+            </a:gs>
+          </a:gsLst>
+          <a:path path="circle">
+            <a:fillToRect l="50000" t="-80000" r="50000" b="180000"/>
+          </a:path>
+        </a:gradFill>
+        <a:gradFill rotWithShape="1">
+          <a:gsLst>
+            <a:gs pos="0">
+              <a:schemeClr val="phClr">
+                <a:tint val="80000"/>
+                <a:satMod val="300000"/>
+              </a:schemeClr>
+            </a:gs>
+            <a:gs pos="100000">
+              <a:schemeClr val="phClr">
+                <a:shade val="30000"/>
+                <a:satMod val="200000"/>
+              </a:schemeClr>
+            </a:gs>
+          </a:gsLst>
+          <a:path path="circle">
+            <a:fillToRect l="50000" t="50000" r="50000" b="50000"/>
+          </a:path>
+        </a:gradFill>
+      </a:bgFillStyleLst>
+    </a:fmtScheme>
+  </a:themeElements>
+  <a:objectDefaults/>
+  <a:extraClrSchemeLst/>
+</a:theme>
 </file>
</xml_diff>